<commit_message>
Divided Inheritance presentation into smaller parts
Plus some minor updates to Notes and Exercises.
</commit_message>
<xml_diff>
--- a/CSharpProgramming/Presentations/OOProgPartII/Exceptions.pptx
+++ b/CSharpProgramming/Presentations/OOProgPartII/Exceptions.pptx
@@ -27,14 +27,13 @@
     <p:sldId id="395" r:id="rId21"/>
     <p:sldId id="396" r:id="rId22"/>
     <p:sldId id="398" r:id="rId23"/>
-    <p:sldId id="399" r:id="rId24"/>
-    <p:sldId id="400" r:id="rId25"/>
-    <p:sldId id="401" r:id="rId26"/>
-    <p:sldId id="402" r:id="rId27"/>
-    <p:sldId id="403" r:id="rId28"/>
-    <p:sldId id="408" r:id="rId29"/>
-    <p:sldId id="404" r:id="rId30"/>
-    <p:sldId id="405" r:id="rId31"/>
+    <p:sldId id="400" r:id="rId24"/>
+    <p:sldId id="401" r:id="rId25"/>
+    <p:sldId id="402" r:id="rId26"/>
+    <p:sldId id="403" r:id="rId27"/>
+    <p:sldId id="408" r:id="rId28"/>
+    <p:sldId id="404" r:id="rId29"/>
+    <p:sldId id="405" r:id="rId30"/>
   </p:sldIdLst>
   <p:sldSz cx="12192000" cy="6858000"/>
   <p:notesSz cx="6858000" cy="9144000"/>
@@ -272,7 +271,7 @@
           <a:p>
             <a:fld id="{E15B7D8E-2A20-4C0E-991C-872DBB7459A8}" type="datetimeFigureOut">
               <a:rPr lang="da-DK" smtClean="0"/>
-              <a:t>02-11-2017</a:t>
+              <a:t>10-03-2018</a:t>
             </a:fld>
             <a:endParaRPr lang="da-DK"/>
           </a:p>
@@ -442,7 +441,7 @@
           <a:p>
             <a:fld id="{E15B7D8E-2A20-4C0E-991C-872DBB7459A8}" type="datetimeFigureOut">
               <a:rPr lang="da-DK" smtClean="0"/>
-              <a:t>02-11-2017</a:t>
+              <a:t>10-03-2018</a:t>
             </a:fld>
             <a:endParaRPr lang="da-DK"/>
           </a:p>
@@ -622,7 +621,7 @@
           <a:p>
             <a:fld id="{E15B7D8E-2A20-4C0E-991C-872DBB7459A8}" type="datetimeFigureOut">
               <a:rPr lang="da-DK" smtClean="0"/>
-              <a:t>02-11-2017</a:t>
+              <a:t>10-03-2018</a:t>
             </a:fld>
             <a:endParaRPr lang="da-DK"/>
           </a:p>
@@ -792,7 +791,7 @@
           <a:p>
             <a:fld id="{E15B7D8E-2A20-4C0E-991C-872DBB7459A8}" type="datetimeFigureOut">
               <a:rPr lang="da-DK" smtClean="0"/>
-              <a:t>02-11-2017</a:t>
+              <a:t>10-03-2018</a:t>
             </a:fld>
             <a:endParaRPr lang="da-DK"/>
           </a:p>
@@ -1038,7 +1037,7 @@
           <a:p>
             <a:fld id="{E15B7D8E-2A20-4C0E-991C-872DBB7459A8}" type="datetimeFigureOut">
               <a:rPr lang="da-DK" smtClean="0"/>
-              <a:t>02-11-2017</a:t>
+              <a:t>10-03-2018</a:t>
             </a:fld>
             <a:endParaRPr lang="da-DK"/>
           </a:p>
@@ -1270,7 +1269,7 @@
           <a:p>
             <a:fld id="{E15B7D8E-2A20-4C0E-991C-872DBB7459A8}" type="datetimeFigureOut">
               <a:rPr lang="da-DK" smtClean="0"/>
-              <a:t>02-11-2017</a:t>
+              <a:t>10-03-2018</a:t>
             </a:fld>
             <a:endParaRPr lang="da-DK"/>
           </a:p>
@@ -1637,7 +1636,7 @@
           <a:p>
             <a:fld id="{E15B7D8E-2A20-4C0E-991C-872DBB7459A8}" type="datetimeFigureOut">
               <a:rPr lang="da-DK" smtClean="0"/>
-              <a:t>02-11-2017</a:t>
+              <a:t>10-03-2018</a:t>
             </a:fld>
             <a:endParaRPr lang="da-DK"/>
           </a:p>
@@ -1755,7 +1754,7 @@
           <a:p>
             <a:fld id="{E15B7D8E-2A20-4C0E-991C-872DBB7459A8}" type="datetimeFigureOut">
               <a:rPr lang="da-DK" smtClean="0"/>
-              <a:t>02-11-2017</a:t>
+              <a:t>10-03-2018</a:t>
             </a:fld>
             <a:endParaRPr lang="da-DK"/>
           </a:p>
@@ -1850,7 +1849,7 @@
           <a:p>
             <a:fld id="{E15B7D8E-2A20-4C0E-991C-872DBB7459A8}" type="datetimeFigureOut">
               <a:rPr lang="da-DK" smtClean="0"/>
-              <a:t>02-11-2017</a:t>
+              <a:t>10-03-2018</a:t>
             </a:fld>
             <a:endParaRPr lang="da-DK"/>
           </a:p>
@@ -2127,7 +2126,7 @@
           <a:p>
             <a:fld id="{E15B7D8E-2A20-4C0E-991C-872DBB7459A8}" type="datetimeFigureOut">
               <a:rPr lang="da-DK" smtClean="0"/>
-              <a:t>02-11-2017</a:t>
+              <a:t>10-03-2018</a:t>
             </a:fld>
             <a:endParaRPr lang="da-DK"/>
           </a:p>
@@ -2380,7 +2379,7 @@
           <a:p>
             <a:fld id="{E15B7D8E-2A20-4C0E-991C-872DBB7459A8}" type="datetimeFigureOut">
               <a:rPr lang="da-DK" smtClean="0"/>
-              <a:t>02-11-2017</a:t>
+              <a:t>10-03-2018</a:t>
             </a:fld>
             <a:endParaRPr lang="da-DK"/>
           </a:p>
@@ -2593,7 +2592,7 @@
           <a:p>
             <a:fld id="{E15B7D8E-2A20-4C0E-991C-872DBB7459A8}" type="datetimeFigureOut">
               <a:rPr lang="da-DK" smtClean="0"/>
-              <a:t>02-11-2017</a:t>
+              <a:t>10-03-2018</a:t>
             </a:fld>
             <a:endParaRPr lang="da-DK"/>
           </a:p>
@@ -3011,7 +3010,7 @@
         <p:spPr>
           <a:xfrm>
             <a:off x="1175085" y="1910432"/>
-            <a:ext cx="9144000" cy="2387600"/>
+            <a:ext cx="9144000" cy="2500930"/>
           </a:xfrm>
         </p:spPr>
         <p:txBody>
@@ -3598,11 +3597,11 @@
   <p:clrMapOvr>
     <a:masterClrMapping/>
   </p:clrMapOvr>
-  <mc:AlternateContent xmlns:mc="http://schemas.openxmlformats.org/markup-compatibility/2006">
-    <mc:Choice xmlns:p14="http://schemas.microsoft.com/office/powerpoint/2010/main" Requires="p14">
+  <mc:AlternateContent xmlns:mc="http://schemas.openxmlformats.org/markup-compatibility/2006" xmlns:p14="http://schemas.microsoft.com/office/powerpoint/2010/main">
+    <mc:Choice Requires="p14">
       <p:transition p14:dur="0"/>
     </mc:Choice>
-    <mc:Fallback>
+    <mc:Fallback xmlns="">
       <p:transition/>
     </mc:Fallback>
   </mc:AlternateContent>
@@ -3997,9 +3996,6 @@
               </a:rPr>
               <a:t>    …</a:t>
             </a:r>
-            <a:endParaRPr lang="da-DK" sz="2000" b="1" smtClean="0">
-              <a:latin typeface="Consolas" panose="020B0609020204030204" pitchFamily="49" charset="0"/>
-            </a:endParaRPr>
           </a:p>
           <a:p>
             <a:r>
@@ -4436,9 +4432,6 @@
               </a:rPr>
               <a:t>    …</a:t>
             </a:r>
-            <a:endParaRPr lang="da-DK" sz="2000" b="1" smtClean="0">
-              <a:latin typeface="Consolas" panose="020B0609020204030204" pitchFamily="49" charset="0"/>
-            </a:endParaRPr>
           </a:p>
           <a:p>
             <a:r>
@@ -4556,13 +4549,13 @@
   <p:clrMapOvr>
     <a:masterClrMapping/>
   </p:clrMapOvr>
-  <mc:AlternateContent xmlns:mc="http://schemas.openxmlformats.org/markup-compatibility/2006">
-    <mc:Choice xmlns:p14="http://schemas.microsoft.com/office/powerpoint/2010/main" Requires="p14">
+  <mc:AlternateContent xmlns:mc="http://schemas.openxmlformats.org/markup-compatibility/2006" xmlns:p14="http://schemas.microsoft.com/office/powerpoint/2010/main">
+    <mc:Choice Requires="p14">
       <p:transition spd="med" p14:dur="700">
         <p:fade/>
       </p:transition>
     </mc:Choice>
-    <mc:Fallback>
+    <mc:Fallback xmlns="">
       <p:transition spd="med">
         <p:fade/>
       </p:transition>
@@ -5244,9 +5237,6 @@
               </a:rPr>
               <a:t>    …</a:t>
             </a:r>
-            <a:endParaRPr lang="da-DK" sz="2400" b="1" smtClean="0">
-              <a:latin typeface="Consolas" panose="020B0609020204030204" pitchFamily="49" charset="0"/>
-            </a:endParaRPr>
           </a:p>
           <a:p>
             <a:r>
@@ -5575,9 +5565,6 @@
               </a:rPr>
               <a:t>    …</a:t>
             </a:r>
-            <a:endParaRPr lang="da-DK" sz="2000" b="1" smtClean="0">
-              <a:latin typeface="Consolas" panose="020B0609020204030204" pitchFamily="49" charset="0"/>
-            </a:endParaRPr>
           </a:p>
           <a:p>
             <a:r>
@@ -5995,16 +5982,7 @@
                 </a:solidFill>
                 <a:latin typeface="Consolas" panose="020B0609020204030204" pitchFamily="49" charset="0"/>
               </a:rPr>
-              <a:t>// </a:t>
-            </a:r>
-            <a:r>
-              <a:rPr lang="da-DK" b="1">
-                <a:solidFill>
-                  <a:srgbClr val="FF0000"/>
-                </a:solidFill>
-                <a:latin typeface="Consolas" panose="020B0609020204030204" pitchFamily="49" charset="0"/>
-              </a:rPr>
-              <a:t>Do </a:t>
+              <a:t>// Do </a:t>
             </a:r>
             <a:r>
               <a:rPr lang="da-DK" b="1" smtClean="0">
@@ -6045,9 +6023,6 @@
               </a:rPr>
               <a:t>    …</a:t>
             </a:r>
-            <a:endParaRPr lang="da-DK" b="1" smtClean="0">
-              <a:latin typeface="Consolas" panose="020B0609020204030204" pitchFamily="49" charset="0"/>
-            </a:endParaRPr>
           </a:p>
           <a:p>
             <a:r>
@@ -6206,13 +6181,13 @@
   <p:clrMapOvr>
     <a:masterClrMapping/>
   </p:clrMapOvr>
-  <mc:AlternateContent xmlns:mc="http://schemas.openxmlformats.org/markup-compatibility/2006">
-    <mc:Choice xmlns:p14="http://schemas.microsoft.com/office/powerpoint/2010/main" Requires="p14">
+  <mc:AlternateContent xmlns:mc="http://schemas.openxmlformats.org/markup-compatibility/2006" xmlns:p14="http://schemas.microsoft.com/office/powerpoint/2010/main">
+    <mc:Choice Requires="p14">
       <p:transition spd="med" p14:dur="700">
         <p:fade/>
       </p:transition>
     </mc:Choice>
-    <mc:Fallback>
+    <mc:Fallback xmlns="">
       <p:transition spd="med">
         <p:fade/>
       </p:transition>
@@ -6421,11 +6396,6 @@
               </a:rPr>
               <a:t>  …</a:t>
             </a:r>
-            <a:endParaRPr lang="da-DK" sz="2400" smtClean="0">
-              <a:solidFill>
-                <a:srgbClr val="FFFF00"/>
-              </a:solidFill>
-            </a:endParaRPr>
           </a:p>
           <a:p>
             <a:r>
@@ -6436,11 +6406,6 @@
               </a:rPr>
               <a:t>}</a:t>
             </a:r>
-            <a:endParaRPr lang="da-DK" sz="2400">
-              <a:solidFill>
-                <a:srgbClr val="FFFF00"/>
-              </a:solidFill>
-            </a:endParaRPr>
           </a:p>
         </p:txBody>
       </p:sp>
@@ -6753,11 +6718,6 @@
               </a:rPr>
               <a:t>  …</a:t>
             </a:r>
-            <a:endParaRPr lang="da-DK" sz="2400" smtClean="0">
-              <a:solidFill>
-                <a:srgbClr val="FFFF00"/>
-              </a:solidFill>
-            </a:endParaRPr>
           </a:p>
           <a:p>
             <a:r>
@@ -6768,11 +6728,6 @@
               </a:rPr>
               <a:t>}</a:t>
             </a:r>
-            <a:endParaRPr lang="da-DK" sz="2400">
-              <a:solidFill>
-                <a:srgbClr val="FFFF00"/>
-              </a:solidFill>
-            </a:endParaRPr>
           </a:p>
         </p:txBody>
       </p:sp>
@@ -7275,11 +7230,6 @@
               </a:rPr>
               <a:t>  …</a:t>
             </a:r>
-            <a:endParaRPr lang="da-DK" sz="2400" smtClean="0">
-              <a:solidFill>
-                <a:srgbClr val="FFFF00"/>
-              </a:solidFill>
-            </a:endParaRPr>
           </a:p>
           <a:p>
             <a:r>
@@ -7290,11 +7240,6 @@
               </a:rPr>
               <a:t>}</a:t>
             </a:r>
-            <a:endParaRPr lang="da-DK" sz="2400">
-              <a:solidFill>
-                <a:srgbClr val="FFFF00"/>
-              </a:solidFill>
-            </a:endParaRPr>
           </a:p>
         </p:txBody>
       </p:sp>
@@ -7645,32 +7590,16 @@
               <a:rPr lang="da-DK" sz="2800" b="1" smtClean="0">
                 <a:latin typeface="Consolas" panose="020B0609020204030204" pitchFamily="49" charset="0"/>
               </a:rPr>
-              <a:t> (amount &lt; 0)</a:t>
-            </a:r>
-          </a:p>
-          <a:p>
+              <a:t> (amount &lt; 0</a:t>
+            </a:r>
+            <a:r>
+              <a:rPr lang="da-DK" sz="2800" b="1" smtClean="0">
+                <a:latin typeface="Consolas" panose="020B0609020204030204" pitchFamily="49" charset="0"/>
+              </a:rPr>
+              <a:t>) </a:t>
+            </a:r>
             <a:r>
               <a:rPr lang="da-DK" sz="2800" b="1">
-                <a:latin typeface="Consolas" panose="020B0609020204030204" pitchFamily="49" charset="0"/>
-              </a:rPr>
-              <a:t> </a:t>
-            </a:r>
-            <a:r>
-              <a:rPr lang="da-DK" sz="2800" b="1" smtClean="0">
-                <a:latin typeface="Consolas" panose="020B0609020204030204" pitchFamily="49" charset="0"/>
-              </a:rPr>
-              <a:t>   {</a:t>
-            </a:r>
-          </a:p>
-          <a:p>
-            <a:r>
-              <a:rPr lang="da-DK" sz="2800" b="1" smtClean="0">
-                <a:latin typeface="Consolas" panose="020B0609020204030204" pitchFamily="49" charset="0"/>
-              </a:rPr>
-              <a:t>        </a:t>
-            </a:r>
-            <a:r>
-              <a:rPr lang="da-DK" sz="2800" b="1" smtClean="0">
                 <a:solidFill>
                   <a:schemeClr val="accent6">
                     <a:lumMod val="75000"/>
@@ -7678,6 +7607,53 @@
                 </a:solidFill>
                 <a:latin typeface="Consolas" panose="020B0609020204030204" pitchFamily="49" charset="0"/>
               </a:rPr>
+              <a:t>// </a:t>
+            </a:r>
+            <a:r>
+              <a:rPr lang="da-DK" sz="2800" b="1" smtClean="0">
+                <a:solidFill>
+                  <a:schemeClr val="accent6">
+                    <a:lumMod val="75000"/>
+                  </a:schemeClr>
+                </a:solidFill>
+                <a:latin typeface="Consolas" panose="020B0609020204030204" pitchFamily="49" charset="0"/>
+              </a:rPr>
+              <a:t>Error detected</a:t>
+            </a:r>
+            <a:endParaRPr lang="da-DK" sz="2800" b="1" smtClean="0">
+              <a:latin typeface="Consolas" panose="020B0609020204030204" pitchFamily="49" charset="0"/>
+            </a:endParaRPr>
+          </a:p>
+          <a:p>
+            <a:r>
+              <a:rPr lang="da-DK" sz="2800" b="1">
+                <a:latin typeface="Consolas" panose="020B0609020204030204" pitchFamily="49" charset="0"/>
+              </a:rPr>
+              <a:t> </a:t>
+            </a:r>
+            <a:r>
+              <a:rPr lang="da-DK" sz="2800" b="1" smtClean="0">
+                <a:latin typeface="Consolas" panose="020B0609020204030204" pitchFamily="49" charset="0"/>
+              </a:rPr>
+              <a:t>   {</a:t>
+            </a:r>
+          </a:p>
+          <a:p>
+            <a:r>
+              <a:rPr lang="da-DK" sz="2800" b="1" smtClean="0">
+                <a:latin typeface="Consolas" panose="020B0609020204030204" pitchFamily="49" charset="0"/>
+              </a:rPr>
+              <a:t>        </a:t>
+            </a:r>
+            <a:r>
+              <a:rPr lang="da-DK" sz="2800" b="1" smtClean="0">
+                <a:solidFill>
+                  <a:schemeClr val="accent6">
+                    <a:lumMod val="75000"/>
+                  </a:schemeClr>
+                </a:solidFill>
+                <a:latin typeface="Consolas" panose="020B0609020204030204" pitchFamily="49" charset="0"/>
+              </a:rPr>
               <a:t>// now what…?</a:t>
             </a:r>
             <a:endParaRPr lang="da-DK" sz="2800" b="1">
@@ -7704,9 +7680,6 @@
               </a:rPr>
               <a:t>    …</a:t>
             </a:r>
-            <a:endParaRPr lang="da-DK" sz="2800" b="1" smtClean="0">
-              <a:latin typeface="Consolas" panose="020B0609020204030204" pitchFamily="49" charset="0"/>
-            </a:endParaRPr>
           </a:p>
           <a:p>
             <a:r>
@@ -7863,11 +7836,6 @@
               </a:rPr>
               <a:t>  …</a:t>
             </a:r>
-            <a:endParaRPr lang="da-DK" sz="2400" smtClean="0">
-              <a:solidFill>
-                <a:srgbClr val="FFFF00"/>
-              </a:solidFill>
-            </a:endParaRPr>
           </a:p>
           <a:p>
             <a:r>
@@ -7878,11 +7846,6 @@
               </a:rPr>
               <a:t>}</a:t>
             </a:r>
-            <a:endParaRPr lang="da-DK" sz="2400">
-              <a:solidFill>
-                <a:srgbClr val="FFFF00"/>
-              </a:solidFill>
-            </a:endParaRPr>
           </a:p>
         </p:txBody>
       </p:sp>
@@ -8249,11 +8212,6 @@
               </a:rPr>
               <a:t>  …</a:t>
             </a:r>
-            <a:endParaRPr lang="da-DK" sz="2400" smtClean="0">
-              <a:solidFill>
-                <a:srgbClr val="FFFF00"/>
-              </a:solidFill>
-            </a:endParaRPr>
           </a:p>
           <a:p>
             <a:r>
@@ -8264,11 +8222,6 @@
               </a:rPr>
               <a:t>}</a:t>
             </a:r>
-            <a:endParaRPr lang="da-DK" sz="2400">
-              <a:solidFill>
-                <a:srgbClr val="FFFF00"/>
-              </a:solidFill>
-            </a:endParaRPr>
           </a:p>
         </p:txBody>
       </p:sp>
@@ -8749,11 +8702,6 @@
               </a:rPr>
               <a:t>  …</a:t>
             </a:r>
-            <a:endParaRPr lang="da-DK" sz="2400" smtClean="0">
-              <a:solidFill>
-                <a:srgbClr val="FFFF00"/>
-              </a:solidFill>
-            </a:endParaRPr>
           </a:p>
           <a:p>
             <a:r>
@@ -8764,11 +8712,6 @@
               </a:rPr>
               <a:t>}</a:t>
             </a:r>
-            <a:endParaRPr lang="da-DK" sz="2400">
-              <a:solidFill>
-                <a:srgbClr val="FFFF00"/>
-              </a:solidFill>
-            </a:endParaRPr>
           </a:p>
         </p:txBody>
       </p:sp>
@@ -9031,458 +8974,6 @@
       </p:grpSpPr>
       <p:sp>
         <p:nvSpPr>
-          <p:cNvPr id="11" name="Tekstfelt 10"/>
-          <p:cNvSpPr txBox="1"/>
-          <p:nvPr/>
-        </p:nvSpPr>
-        <p:spPr>
-          <a:xfrm>
-            <a:off x="925057" y="668956"/>
-            <a:ext cx="9572496" cy="4278094"/>
-          </a:xfrm>
-          <a:prstGeom prst="rect">
-            <a:avLst/>
-          </a:prstGeom>
-          <a:noFill/>
-        </p:spPr>
-        <p:txBody>
-          <a:bodyPr wrap="square" rtlCol="0">
-            <a:spAutoFit/>
-          </a:bodyPr>
-          <a:lstStyle/>
-          <a:p>
-            <a:endParaRPr lang="en-US" sz="2000" b="1" smtClean="0">
-              <a:latin typeface="Consolas" panose="020B0609020204030204" pitchFamily="49" charset="0"/>
-            </a:endParaRPr>
-          </a:p>
-          <a:p>
-            <a:r>
-              <a:rPr lang="en-US" sz="2000" b="1" smtClean="0">
-                <a:latin typeface="Consolas" panose="020B0609020204030204" pitchFamily="49" charset="0"/>
-              </a:rPr>
-              <a:t>System.IO.StreamReader </a:t>
-            </a:r>
-            <a:r>
-              <a:rPr lang="en-US" sz="2000" b="1">
-                <a:latin typeface="Consolas" panose="020B0609020204030204" pitchFamily="49" charset="0"/>
-              </a:rPr>
-              <a:t>file = </a:t>
-            </a:r>
-            <a:r>
-              <a:rPr lang="en-US" sz="2000" b="1">
-                <a:solidFill>
-                  <a:srgbClr val="0070C0"/>
-                </a:solidFill>
-                <a:latin typeface="Consolas" panose="020B0609020204030204" pitchFamily="49" charset="0"/>
-              </a:rPr>
-              <a:t>new</a:t>
-            </a:r>
-            <a:r>
-              <a:rPr lang="en-US" sz="2000" b="1">
-                <a:latin typeface="Consolas" panose="020B0609020204030204" pitchFamily="49" charset="0"/>
-              </a:rPr>
-              <a:t> </a:t>
-            </a:r>
-            <a:r>
-              <a:rPr lang="en-US" sz="2000" b="1">
-                <a:solidFill>
-                  <a:schemeClr val="accent6">
-                    <a:lumMod val="75000"/>
-                  </a:schemeClr>
-                </a:solidFill>
-                <a:latin typeface="Consolas" panose="020B0609020204030204" pitchFamily="49" charset="0"/>
-              </a:rPr>
-              <a:t>System.IO.StreamReader</a:t>
-            </a:r>
-            <a:r>
-              <a:rPr lang="en-US" sz="2000" b="1">
-                <a:latin typeface="Consolas" panose="020B0609020204030204" pitchFamily="49" charset="0"/>
-              </a:rPr>
-              <a:t>(path);</a:t>
-            </a:r>
-            <a:endParaRPr lang="da-DK" sz="2000" b="1">
-              <a:latin typeface="Consolas" panose="020B0609020204030204" pitchFamily="49" charset="0"/>
-            </a:endParaRPr>
-          </a:p>
-          <a:p>
-            <a:r>
-              <a:rPr lang="en-US" sz="2000" b="1">
-                <a:solidFill>
-                  <a:srgbClr val="0070C0"/>
-                </a:solidFill>
-                <a:latin typeface="Consolas" panose="020B0609020204030204" pitchFamily="49" charset="0"/>
-              </a:rPr>
-              <a:t>char</a:t>
-            </a:r>
-            <a:r>
-              <a:rPr lang="en-US" sz="2000" b="1">
-                <a:latin typeface="Consolas" panose="020B0609020204030204" pitchFamily="49" charset="0"/>
-              </a:rPr>
-              <a:t>[] buffer = </a:t>
-            </a:r>
-            <a:r>
-              <a:rPr lang="en-US" sz="2000" b="1">
-                <a:solidFill>
-                  <a:srgbClr val="0070C0"/>
-                </a:solidFill>
-                <a:latin typeface="Consolas" panose="020B0609020204030204" pitchFamily="49" charset="0"/>
-              </a:rPr>
-              <a:t>new </a:t>
-            </a:r>
-            <a:r>
-              <a:rPr lang="en-US" sz="2000" b="1">
-                <a:solidFill>
-                  <a:srgbClr val="0070C0"/>
-                </a:solidFill>
-                <a:latin typeface="Consolas" panose="020B0609020204030204" pitchFamily="49" charset="0"/>
-              </a:rPr>
-              <a:t>char</a:t>
-            </a:r>
-            <a:r>
-              <a:rPr lang="en-US" sz="2000" b="1">
-                <a:latin typeface="Consolas" panose="020B0609020204030204" pitchFamily="49" charset="0"/>
-              </a:rPr>
-              <a:t>[10</a:t>
-            </a:r>
-            <a:r>
-              <a:rPr lang="en-US" sz="2000" b="1" smtClean="0">
-                <a:latin typeface="Consolas" panose="020B0609020204030204" pitchFamily="49" charset="0"/>
-              </a:rPr>
-              <a:t>];</a:t>
-            </a:r>
-          </a:p>
-          <a:p>
-            <a:endParaRPr lang="da-DK" sz="2000" b="1">
-              <a:latin typeface="Consolas" panose="020B0609020204030204" pitchFamily="49" charset="0"/>
-            </a:endParaRPr>
-          </a:p>
-          <a:p>
-            <a:r>
-              <a:rPr lang="en-US" sz="2000" b="1">
-                <a:solidFill>
-                  <a:srgbClr val="0070C0"/>
-                </a:solidFill>
-                <a:latin typeface="Consolas" panose="020B0609020204030204" pitchFamily="49" charset="0"/>
-              </a:rPr>
-              <a:t>try</a:t>
-            </a:r>
-            <a:endParaRPr lang="da-DK" sz="2000" b="1">
-              <a:solidFill>
-                <a:srgbClr val="0070C0"/>
-              </a:solidFill>
-              <a:latin typeface="Consolas" panose="020B0609020204030204" pitchFamily="49" charset="0"/>
-            </a:endParaRPr>
-          </a:p>
-          <a:p>
-            <a:r>
-              <a:rPr lang="en-US" sz="2000" b="1">
-                <a:latin typeface="Consolas" panose="020B0609020204030204" pitchFamily="49" charset="0"/>
-              </a:rPr>
-              <a:t>{</a:t>
-            </a:r>
-            <a:endParaRPr lang="da-DK" sz="2000" b="1">
-              <a:latin typeface="Consolas" panose="020B0609020204030204" pitchFamily="49" charset="0"/>
-            </a:endParaRPr>
-          </a:p>
-          <a:p>
-            <a:r>
-              <a:rPr lang="en-US" sz="2000" b="1">
-                <a:latin typeface="Consolas" panose="020B0609020204030204" pitchFamily="49" charset="0"/>
-              </a:rPr>
-              <a:t> </a:t>
-            </a:r>
-            <a:r>
-              <a:rPr lang="en-US" sz="2000" b="1" smtClean="0">
-                <a:latin typeface="Consolas" panose="020B0609020204030204" pitchFamily="49" charset="0"/>
-              </a:rPr>
-              <a:t>   file.ReadBlock(buffer</a:t>
-            </a:r>
-            <a:r>
-              <a:rPr lang="en-US" sz="2000" b="1">
-                <a:latin typeface="Consolas" panose="020B0609020204030204" pitchFamily="49" charset="0"/>
-              </a:rPr>
-              <a:t>, index, buffer.Length);</a:t>
-            </a:r>
-            <a:endParaRPr lang="da-DK" sz="2000" b="1">
-              <a:latin typeface="Consolas" panose="020B0609020204030204" pitchFamily="49" charset="0"/>
-            </a:endParaRPr>
-          </a:p>
-          <a:p>
-            <a:r>
-              <a:rPr lang="en-US" sz="2000" b="1" smtClean="0">
-                <a:latin typeface="Consolas" panose="020B0609020204030204" pitchFamily="49" charset="0"/>
-              </a:rPr>
-              <a:t>    </a:t>
-            </a:r>
-            <a:r>
-              <a:rPr lang="en-US" sz="2000" b="1" smtClean="0">
-                <a:solidFill>
-                  <a:schemeClr val="accent6">
-                    <a:lumMod val="75000"/>
-                  </a:schemeClr>
-                </a:solidFill>
-                <a:latin typeface="Consolas" panose="020B0609020204030204" pitchFamily="49" charset="0"/>
-              </a:rPr>
-              <a:t>// </a:t>
-            </a:r>
-            <a:r>
-              <a:rPr lang="en-US" sz="2000" b="1">
-                <a:solidFill>
-                  <a:schemeClr val="accent6">
-                    <a:lumMod val="75000"/>
-                  </a:schemeClr>
-                </a:solidFill>
-                <a:latin typeface="Consolas" panose="020B0609020204030204" pitchFamily="49" charset="0"/>
-              </a:rPr>
-              <a:t>file.Close(); Moved to finally-block</a:t>
-            </a:r>
-            <a:endParaRPr lang="da-DK" sz="2000" b="1">
-              <a:solidFill>
-                <a:schemeClr val="accent6">
-                  <a:lumMod val="75000"/>
-                </a:schemeClr>
-              </a:solidFill>
-              <a:latin typeface="Consolas" panose="020B0609020204030204" pitchFamily="49" charset="0"/>
-            </a:endParaRPr>
-          </a:p>
-          <a:p>
-            <a:r>
-              <a:rPr lang="en-US" sz="2000" b="1">
-                <a:latin typeface="Consolas" panose="020B0609020204030204" pitchFamily="49" charset="0"/>
-              </a:rPr>
-              <a:t>}</a:t>
-            </a:r>
-            <a:endParaRPr lang="da-DK" sz="2000" b="1">
-              <a:latin typeface="Consolas" panose="020B0609020204030204" pitchFamily="49" charset="0"/>
-            </a:endParaRPr>
-          </a:p>
-          <a:p>
-            <a:r>
-              <a:rPr lang="en-US" sz="2000" b="1">
-                <a:solidFill>
-                  <a:srgbClr val="0070C0"/>
-                </a:solidFill>
-                <a:latin typeface="Consolas" panose="020B0609020204030204" pitchFamily="49" charset="0"/>
-              </a:rPr>
-              <a:t>finally</a:t>
-            </a:r>
-            <a:endParaRPr lang="da-DK" sz="2000" b="1">
-              <a:solidFill>
-                <a:srgbClr val="0070C0"/>
-              </a:solidFill>
-              <a:latin typeface="Consolas" panose="020B0609020204030204" pitchFamily="49" charset="0"/>
-            </a:endParaRPr>
-          </a:p>
-          <a:p>
-            <a:r>
-              <a:rPr lang="en-US" sz="2000" b="1">
-                <a:latin typeface="Consolas" panose="020B0609020204030204" pitchFamily="49" charset="0"/>
-              </a:rPr>
-              <a:t>{</a:t>
-            </a:r>
-            <a:endParaRPr lang="da-DK" sz="2000" b="1">
-              <a:latin typeface="Consolas" panose="020B0609020204030204" pitchFamily="49" charset="0"/>
-            </a:endParaRPr>
-          </a:p>
-          <a:p>
-            <a:r>
-              <a:rPr lang="en-US" sz="2000" b="1" smtClean="0">
-                <a:latin typeface="Consolas" panose="020B0609020204030204" pitchFamily="49" charset="0"/>
-              </a:rPr>
-              <a:t>    file.Close</a:t>
-            </a:r>
-            <a:r>
-              <a:rPr lang="en-US" sz="2000" b="1">
-                <a:latin typeface="Consolas" panose="020B0609020204030204" pitchFamily="49" charset="0"/>
-              </a:rPr>
-              <a:t>();</a:t>
-            </a:r>
-            <a:endParaRPr lang="da-DK" sz="2000" b="1">
-              <a:latin typeface="Consolas" panose="020B0609020204030204" pitchFamily="49" charset="0"/>
-            </a:endParaRPr>
-          </a:p>
-          <a:p>
-            <a:r>
-              <a:rPr lang="en-US" sz="2000" b="1">
-                <a:latin typeface="Consolas" panose="020B0609020204030204" pitchFamily="49" charset="0"/>
-              </a:rPr>
-              <a:t>}</a:t>
-            </a:r>
-            <a:endParaRPr lang="da-DK" sz="2000" b="1">
-              <a:latin typeface="Consolas" panose="020B0609020204030204" pitchFamily="49" charset="0"/>
-            </a:endParaRPr>
-          </a:p>
-          <a:p>
-            <a:endParaRPr lang="da-DK" sz="1200" b="1" smtClean="0">
-              <a:latin typeface="Consolas" panose="020B0609020204030204" pitchFamily="49" charset="0"/>
-            </a:endParaRPr>
-          </a:p>
-        </p:txBody>
-      </p:sp>
-      <p:pic>
-        <p:nvPicPr>
-          <p:cNvPr id="7170" name="Picture 2" descr="Billedresultat for guarantee icon"/>
-          <p:cNvPicPr>
-            <a:picLocks noChangeAspect="1" noChangeArrowheads="1"/>
-          </p:cNvPicPr>
-          <p:nvPr/>
-        </p:nvPicPr>
-        <p:blipFill>
-          <a:blip r:embed="rId2" cstate="print">
-            <a:extLst>
-              <a:ext uri="{28A0092B-C50C-407E-A947-70E740481C1C}">
-                <a14:useLocalDpi xmlns:a14="http://schemas.microsoft.com/office/drawing/2010/main" val="0"/>
-              </a:ext>
-            </a:extLst>
-          </a:blip>
-          <a:srcRect/>
-          <a:stretch>
-            <a:fillRect/>
-          </a:stretch>
-        </p:blipFill>
-        <p:spPr bwMode="auto">
-          <a:xfrm>
-            <a:off x="3641445" y="3630507"/>
-            <a:ext cx="1261439" cy="1114846"/>
-          </a:xfrm>
-          <a:prstGeom prst="rect">
-            <a:avLst/>
-          </a:prstGeom>
-          <a:noFill/>
-          <a:extLst>
-            <a:ext uri="{909E8E84-426E-40DD-AFC4-6F175D3DCCD1}">
-              <a14:hiddenFill xmlns:a14="http://schemas.microsoft.com/office/drawing/2010/main">
-                <a:solidFill>
-                  <a:srgbClr val="FFFFFF"/>
-                </a:solidFill>
-              </a14:hiddenFill>
-            </a:ext>
-          </a:extLst>
-        </p:spPr>
-      </p:pic>
-    </p:spTree>
-    <p:extLst>
-      <p:ext uri="{BB962C8B-B14F-4D97-AF65-F5344CB8AC3E}">
-        <p14:creationId xmlns:p14="http://schemas.microsoft.com/office/powerpoint/2010/main" val="3785508975"/>
-      </p:ext>
-    </p:extLst>
-  </p:cSld>
-  <p:clrMapOvr>
-    <a:masterClrMapping/>
-  </p:clrMapOvr>
-  <mc:AlternateContent xmlns:mc="http://schemas.openxmlformats.org/markup-compatibility/2006" xmlns:p14="http://schemas.microsoft.com/office/powerpoint/2010/main">
-    <mc:Choice Requires="p14">
-      <p:transition p14:dur="0"/>
-    </mc:Choice>
-    <mc:Fallback xmlns="">
-      <p:transition/>
-    </mc:Fallback>
-  </mc:AlternateContent>
-  <p:timing>
-    <p:tnLst>
-      <p:par>
-        <p:cTn id="1" dur="indefinite" restart="never" nodeType="tmRoot">
-          <p:childTnLst>
-            <p:seq concurrent="1" nextAc="seek">
-              <p:cTn id="2" dur="indefinite" nodeType="mainSeq">
-                <p:childTnLst>
-                  <p:par>
-                    <p:cTn id="3" fill="hold">
-                      <p:stCondLst>
-                        <p:cond delay="indefinite"/>
-                      </p:stCondLst>
-                      <p:childTnLst>
-                        <p:par>
-                          <p:cTn id="4" fill="hold">
-                            <p:stCondLst>
-                              <p:cond delay="0"/>
-                            </p:stCondLst>
-                            <p:childTnLst>
-                              <p:par>
-                                <p:cTn id="5" presetID="10" presetClass="entr" presetSubtype="0" fill="hold" nodeType="clickEffect">
-                                  <p:stCondLst>
-                                    <p:cond delay="0"/>
-                                  </p:stCondLst>
-                                  <p:childTnLst>
-                                    <p:set>
-                                      <p:cBhvr>
-                                        <p:cTn id="6" dur="1" fill="hold">
-                                          <p:stCondLst>
-                                            <p:cond delay="0"/>
-                                          </p:stCondLst>
-                                        </p:cTn>
-                                        <p:tgtEl>
-                                          <p:spTgt spid="7170"/>
-                                        </p:tgtEl>
-                                        <p:attrNameLst>
-                                          <p:attrName>style.visibility</p:attrName>
-                                        </p:attrNameLst>
-                                      </p:cBhvr>
-                                      <p:to>
-                                        <p:strVal val="visible"/>
-                                      </p:to>
-                                    </p:set>
-                                    <p:animEffect transition="in" filter="fade">
-                                      <p:cBhvr>
-                                        <p:cTn id="7" dur="500"/>
-                                        <p:tgtEl>
-                                          <p:spTgt spid="7170"/>
-                                        </p:tgtEl>
-                                      </p:cBhvr>
-                                    </p:animEffect>
-                                  </p:childTnLst>
-                                </p:cTn>
-                              </p:par>
-                            </p:childTnLst>
-                          </p:cTn>
-                        </p:par>
-                      </p:childTnLst>
-                    </p:cTn>
-                  </p:par>
-                </p:childTnLst>
-              </p:cTn>
-              <p:prevCondLst>
-                <p:cond evt="onPrev" delay="0">
-                  <p:tgtEl>
-                    <p:sldTgt/>
-                  </p:tgtEl>
-                </p:cond>
-              </p:prevCondLst>
-              <p:nextCondLst>
-                <p:cond evt="onNext" delay="0">
-                  <p:tgtEl>
-                    <p:sldTgt/>
-                  </p:tgtEl>
-                </p:cond>
-              </p:nextCondLst>
-            </p:seq>
-          </p:childTnLst>
-        </p:cTn>
-      </p:par>
-    </p:tnLst>
-  </p:timing>
-</p:sld>
-</file>
-
-<file path=ppt/slides/slide24.xml><?xml version="1.0" encoding="utf-8"?>
-<p:sld xmlns:a="http://schemas.openxmlformats.org/drawingml/2006/main" xmlns:r="http://schemas.openxmlformats.org/officeDocument/2006/relationships" xmlns:p="http://schemas.openxmlformats.org/presentationml/2006/main">
-  <p:cSld>
-    <p:spTree>
-      <p:nvGrpSpPr>
-        <p:cNvPr id="1" name=""/>
-        <p:cNvGrpSpPr/>
-        <p:nvPr/>
-      </p:nvGrpSpPr>
-      <p:grpSpPr>
-        <a:xfrm>
-          <a:off x="0" y="0"/>
-          <a:ext cx="0" cy="0"/>
-          <a:chOff x="0" y="0"/>
-          <a:chExt cx="0" cy="0"/>
-        </a:xfrm>
-      </p:grpSpPr>
-      <p:sp>
-        <p:nvSpPr>
           <p:cNvPr id="2" name="Afrundet rektangel 1"/>
           <p:cNvSpPr/>
           <p:nvPr/>
@@ -10021,11 +9512,11 @@
   <p:clrMapOvr>
     <a:masterClrMapping/>
   </p:clrMapOvr>
-  <mc:AlternateContent xmlns:mc="http://schemas.openxmlformats.org/markup-compatibility/2006">
-    <mc:Choice xmlns:p14="http://schemas.microsoft.com/office/powerpoint/2010/main" Requires="p14">
+  <mc:AlternateContent xmlns:mc="http://schemas.openxmlformats.org/markup-compatibility/2006" xmlns:p14="http://schemas.microsoft.com/office/powerpoint/2010/main">
+    <mc:Choice Requires="p14">
       <p:transition p14:dur="0"/>
     </mc:Choice>
-    <mc:Fallback>
+    <mc:Fallback xmlns="">
       <p:transition/>
     </mc:Fallback>
   </mc:AlternateContent>
@@ -10105,7 +9596,7 @@
 </p:sld>
 </file>
 
-<file path=ppt/slides/slide25.xml><?xml version="1.0" encoding="utf-8"?>
+<file path=ppt/slides/slide24.xml><?xml version="1.0" encoding="utf-8"?>
 <p:sld xmlns:a="http://schemas.openxmlformats.org/drawingml/2006/main" xmlns:r="http://schemas.openxmlformats.org/officeDocument/2006/relationships" xmlns:p="http://schemas.openxmlformats.org/presentationml/2006/main">
   <p:cSld>
     <p:spTree>
@@ -10684,7 +10175,7 @@
 </p:sld>
 </file>
 
-<file path=ppt/slides/slide26.xml><?xml version="1.0" encoding="utf-8"?>
+<file path=ppt/slides/slide25.xml><?xml version="1.0" encoding="utf-8"?>
 <p:sld xmlns:a="http://schemas.openxmlformats.org/drawingml/2006/main" xmlns:r="http://schemas.openxmlformats.org/officeDocument/2006/relationships" xmlns:p="http://schemas.openxmlformats.org/presentationml/2006/main">
   <p:cSld>
     <p:spTree>
@@ -11329,7 +10820,7 @@
 </p:sld>
 </file>
 
-<file path=ppt/slides/slide27.xml><?xml version="1.0" encoding="utf-8"?>
+<file path=ppt/slides/slide26.xml><?xml version="1.0" encoding="utf-8"?>
 <p:sld xmlns:a="http://schemas.openxmlformats.org/drawingml/2006/main" xmlns:r="http://schemas.openxmlformats.org/officeDocument/2006/relationships" xmlns:p="http://schemas.openxmlformats.org/presentationml/2006/main">
   <p:cSld>
     <p:spTree>
@@ -11880,6 +11371,531 @@
     <p:extLst>
       <p:ext uri="{BB962C8B-B14F-4D97-AF65-F5344CB8AC3E}">
         <p14:creationId xmlns:p14="http://schemas.microsoft.com/office/powerpoint/2010/main" val="1411034706"/>
+      </p:ext>
+    </p:extLst>
+  </p:cSld>
+  <p:clrMapOvr>
+    <a:masterClrMapping/>
+  </p:clrMapOvr>
+  <mc:AlternateContent xmlns:mc="http://schemas.openxmlformats.org/markup-compatibility/2006" xmlns:p14="http://schemas.microsoft.com/office/powerpoint/2010/main">
+    <mc:Choice Requires="p14">
+      <p:transition spd="med" p14:dur="700">
+        <p:fade/>
+      </p:transition>
+    </mc:Choice>
+    <mc:Fallback xmlns="">
+      <p:transition spd="med">
+        <p:fade/>
+      </p:transition>
+    </mc:Fallback>
+  </mc:AlternateContent>
+  <p:timing>
+    <p:tnLst>
+      <p:par>
+        <p:cTn id="1" dur="indefinite" restart="never" nodeType="tmRoot"/>
+      </p:par>
+    </p:tnLst>
+  </p:timing>
+</p:sld>
+</file>
+
+<file path=ppt/slides/slide27.xml><?xml version="1.0" encoding="utf-8"?>
+<p:sld xmlns:a="http://schemas.openxmlformats.org/drawingml/2006/main" xmlns:r="http://schemas.openxmlformats.org/officeDocument/2006/relationships" xmlns:p="http://schemas.openxmlformats.org/presentationml/2006/main">
+  <p:cSld>
+    <p:spTree>
+      <p:nvGrpSpPr>
+        <p:cNvPr id="1" name=""/>
+        <p:cNvGrpSpPr/>
+        <p:nvPr/>
+      </p:nvGrpSpPr>
+      <p:grpSpPr>
+        <a:xfrm>
+          <a:off x="0" y="0"/>
+          <a:ext cx="0" cy="0"/>
+          <a:chOff x="0" y="0"/>
+          <a:chExt cx="0" cy="0"/>
+        </a:xfrm>
+      </p:grpSpPr>
+      <p:sp>
+        <p:nvSpPr>
+          <p:cNvPr id="2" name="Afrundet rektangel 1"/>
+          <p:cNvSpPr/>
+          <p:nvPr/>
+        </p:nvSpPr>
+        <p:spPr>
+          <a:xfrm>
+            <a:off x="1359570" y="511340"/>
+            <a:ext cx="1588168" cy="5793205"/>
+          </a:xfrm>
+          <a:prstGeom prst="roundRect">
+            <a:avLst/>
+          </a:prstGeom>
+          <a:solidFill>
+            <a:schemeClr val="accent6">
+              <a:lumMod val="75000"/>
+            </a:schemeClr>
+          </a:solidFill>
+        </p:spPr>
+        <p:style>
+          <a:lnRef idx="2">
+            <a:schemeClr val="accent1">
+              <a:shade val="50000"/>
+            </a:schemeClr>
+          </a:lnRef>
+          <a:fillRef idx="1">
+            <a:schemeClr val="accent1"/>
+          </a:fillRef>
+          <a:effectRef idx="0">
+            <a:schemeClr val="accent1"/>
+          </a:effectRef>
+          <a:fontRef idx="minor">
+            <a:schemeClr val="lt1"/>
+          </a:fontRef>
+        </p:style>
+        <p:txBody>
+          <a:bodyPr rtlCol="0" anchor="t"/>
+          <a:lstStyle/>
+          <a:p>
+            <a:r>
+              <a:rPr lang="da-DK" sz="2400" smtClean="0"/>
+              <a:t>Bank</a:t>
+            </a:r>
+          </a:p>
+          <a:p>
+            <a:r>
+              <a:rPr lang="da-DK" sz="2400" smtClean="0"/>
+              <a:t>GUI</a:t>
+            </a:r>
+            <a:endParaRPr lang="da-DK" sz="2400"/>
+          </a:p>
+        </p:txBody>
+      </p:sp>
+      <p:sp>
+        <p:nvSpPr>
+          <p:cNvPr id="8" name="Afrundet rektangel 7"/>
+          <p:cNvSpPr/>
+          <p:nvPr/>
+        </p:nvSpPr>
+        <p:spPr>
+          <a:xfrm>
+            <a:off x="3753943" y="511340"/>
+            <a:ext cx="1588168" cy="5793205"/>
+          </a:xfrm>
+          <a:prstGeom prst="roundRect">
+            <a:avLst/>
+          </a:prstGeom>
+          <a:solidFill>
+            <a:schemeClr val="accent6">
+              <a:lumMod val="75000"/>
+            </a:schemeClr>
+          </a:solidFill>
+        </p:spPr>
+        <p:style>
+          <a:lnRef idx="2">
+            <a:schemeClr val="accent1">
+              <a:shade val="50000"/>
+            </a:schemeClr>
+          </a:lnRef>
+          <a:fillRef idx="1">
+            <a:schemeClr val="accent1"/>
+          </a:fillRef>
+          <a:effectRef idx="0">
+            <a:schemeClr val="accent1"/>
+          </a:effectRef>
+          <a:fontRef idx="minor">
+            <a:schemeClr val="lt1"/>
+          </a:fontRef>
+        </p:style>
+        <p:txBody>
+          <a:bodyPr rtlCol="0" anchor="t"/>
+          <a:lstStyle/>
+          <a:p>
+            <a:r>
+              <a:rPr lang="da-DK" sz="2400" smtClean="0"/>
+              <a:t>Bank</a:t>
+            </a:r>
+          </a:p>
+          <a:p>
+            <a:r>
+              <a:rPr lang="da-DK" sz="2400" smtClean="0"/>
+              <a:t>Model</a:t>
+            </a:r>
+            <a:endParaRPr lang="da-DK" sz="2400"/>
+          </a:p>
+        </p:txBody>
+      </p:sp>
+      <p:cxnSp>
+        <p:nvCxnSpPr>
+          <p:cNvPr id="6" name="Lige pilforbindelse 5"/>
+          <p:cNvCxnSpPr/>
+          <p:nvPr/>
+        </p:nvCxnSpPr>
+        <p:spPr>
+          <a:xfrm>
+            <a:off x="2594187" y="2181013"/>
+            <a:ext cx="1889760" cy="0"/>
+          </a:xfrm>
+          <a:prstGeom prst="straightConnector1">
+            <a:avLst/>
+          </a:prstGeom>
+          <a:ln w="76200">
+            <a:solidFill>
+              <a:srgbClr val="FFC000"/>
+            </a:solidFill>
+            <a:tailEnd type="triangle" w="lg" len="lg"/>
+          </a:ln>
+        </p:spPr>
+        <p:style>
+          <a:lnRef idx="1">
+            <a:schemeClr val="accent1"/>
+          </a:lnRef>
+          <a:fillRef idx="0">
+            <a:schemeClr val="accent1"/>
+          </a:fillRef>
+          <a:effectRef idx="0">
+            <a:schemeClr val="accent1"/>
+          </a:effectRef>
+          <a:fontRef idx="minor">
+            <a:schemeClr val="tx1"/>
+          </a:fontRef>
+        </p:style>
+      </p:cxnSp>
+      <p:sp>
+        <p:nvSpPr>
+          <p:cNvPr id="10" name="Afrundet rektangel 9"/>
+          <p:cNvSpPr/>
+          <p:nvPr/>
+        </p:nvSpPr>
+        <p:spPr>
+          <a:xfrm>
+            <a:off x="6148316" y="511340"/>
+            <a:ext cx="1588168" cy="5793205"/>
+          </a:xfrm>
+          <a:prstGeom prst="roundRect">
+            <a:avLst/>
+          </a:prstGeom>
+          <a:solidFill>
+            <a:schemeClr val="accent6">
+              <a:lumMod val="75000"/>
+            </a:schemeClr>
+          </a:solidFill>
+        </p:spPr>
+        <p:style>
+          <a:lnRef idx="2">
+            <a:schemeClr val="accent1">
+              <a:shade val="50000"/>
+            </a:schemeClr>
+          </a:lnRef>
+          <a:fillRef idx="1">
+            <a:schemeClr val="accent1"/>
+          </a:fillRef>
+          <a:effectRef idx="0">
+            <a:schemeClr val="accent1"/>
+          </a:effectRef>
+          <a:fontRef idx="minor">
+            <a:schemeClr val="lt1"/>
+          </a:fontRef>
+        </p:style>
+        <p:txBody>
+          <a:bodyPr rtlCol="0" anchor="t"/>
+          <a:lstStyle/>
+          <a:p>
+            <a:r>
+              <a:rPr lang="da-DK" sz="2400" smtClean="0"/>
+              <a:t>Bank</a:t>
+            </a:r>
+          </a:p>
+          <a:p>
+            <a:r>
+              <a:rPr lang="da-DK" sz="2400" smtClean="0"/>
+              <a:t>Account</a:t>
+            </a:r>
+          </a:p>
+          <a:p>
+            <a:r>
+              <a:rPr lang="da-DK" sz="2400" smtClean="0"/>
+              <a:t>Collection</a:t>
+            </a:r>
+            <a:endParaRPr lang="da-DK" sz="2400"/>
+          </a:p>
+        </p:txBody>
+      </p:sp>
+      <p:sp>
+        <p:nvSpPr>
+          <p:cNvPr id="11" name="Afrundet rektangel 10"/>
+          <p:cNvSpPr/>
+          <p:nvPr/>
+        </p:nvSpPr>
+        <p:spPr>
+          <a:xfrm>
+            <a:off x="8542689" y="511339"/>
+            <a:ext cx="1588168" cy="5793205"/>
+          </a:xfrm>
+          <a:prstGeom prst="roundRect">
+            <a:avLst/>
+          </a:prstGeom>
+          <a:solidFill>
+            <a:schemeClr val="accent6">
+              <a:lumMod val="75000"/>
+            </a:schemeClr>
+          </a:solidFill>
+        </p:spPr>
+        <p:style>
+          <a:lnRef idx="2">
+            <a:schemeClr val="accent1">
+              <a:shade val="50000"/>
+            </a:schemeClr>
+          </a:lnRef>
+          <a:fillRef idx="1">
+            <a:schemeClr val="accent1"/>
+          </a:fillRef>
+          <a:effectRef idx="0">
+            <a:schemeClr val="accent1"/>
+          </a:effectRef>
+          <a:fontRef idx="minor">
+            <a:schemeClr val="lt1"/>
+          </a:fontRef>
+        </p:style>
+        <p:txBody>
+          <a:bodyPr rtlCol="0" anchor="t"/>
+          <a:lstStyle/>
+          <a:p>
+            <a:r>
+              <a:rPr lang="da-DK" sz="2400" smtClean="0"/>
+              <a:t>Bank</a:t>
+            </a:r>
+          </a:p>
+          <a:p>
+            <a:r>
+              <a:rPr lang="da-DK" sz="2400" smtClean="0"/>
+              <a:t>Account</a:t>
+            </a:r>
+          </a:p>
+          <a:p>
+            <a:endParaRPr lang="da-DK" sz="2400"/>
+          </a:p>
+        </p:txBody>
+      </p:sp>
+      <p:cxnSp>
+        <p:nvCxnSpPr>
+          <p:cNvPr id="12" name="Lige pilforbindelse 11"/>
+          <p:cNvCxnSpPr/>
+          <p:nvPr/>
+        </p:nvCxnSpPr>
+        <p:spPr>
+          <a:xfrm>
+            <a:off x="4805680" y="2929467"/>
+            <a:ext cx="1889760" cy="0"/>
+          </a:xfrm>
+          <a:prstGeom prst="straightConnector1">
+            <a:avLst/>
+          </a:prstGeom>
+          <a:ln w="76200">
+            <a:solidFill>
+              <a:srgbClr val="FFC000"/>
+            </a:solidFill>
+            <a:tailEnd type="triangle" w="lg" len="lg"/>
+          </a:ln>
+        </p:spPr>
+        <p:style>
+          <a:lnRef idx="1">
+            <a:schemeClr val="accent1"/>
+          </a:lnRef>
+          <a:fillRef idx="0">
+            <a:schemeClr val="accent1"/>
+          </a:fillRef>
+          <a:effectRef idx="0">
+            <a:schemeClr val="accent1"/>
+          </a:effectRef>
+          <a:fontRef idx="minor">
+            <a:schemeClr val="tx1"/>
+          </a:fontRef>
+        </p:style>
+      </p:cxnSp>
+      <p:cxnSp>
+        <p:nvCxnSpPr>
+          <p:cNvPr id="13" name="Lige pilforbindelse 12"/>
+          <p:cNvCxnSpPr/>
+          <p:nvPr/>
+        </p:nvCxnSpPr>
+        <p:spPr>
+          <a:xfrm>
+            <a:off x="7223760" y="3796453"/>
+            <a:ext cx="1889760" cy="0"/>
+          </a:xfrm>
+          <a:prstGeom prst="straightConnector1">
+            <a:avLst/>
+          </a:prstGeom>
+          <a:ln w="76200">
+            <a:solidFill>
+              <a:srgbClr val="FFC000"/>
+            </a:solidFill>
+            <a:tailEnd type="triangle" w="lg" len="lg"/>
+          </a:ln>
+        </p:spPr>
+        <p:style>
+          <a:lnRef idx="1">
+            <a:schemeClr val="accent1"/>
+          </a:lnRef>
+          <a:fillRef idx="0">
+            <a:schemeClr val="accent1"/>
+          </a:fillRef>
+          <a:effectRef idx="0">
+            <a:schemeClr val="accent1"/>
+          </a:effectRef>
+          <a:fontRef idx="minor">
+            <a:schemeClr val="tx1"/>
+          </a:fontRef>
+        </p:style>
+      </p:cxnSp>
+      <p:pic>
+        <p:nvPicPr>
+          <p:cNvPr id="14" name="Picture 4" descr="Billedresultat for signaling icon"/>
+          <p:cNvPicPr>
+            <a:picLocks noChangeAspect="1" noChangeArrowheads="1"/>
+          </p:cNvPicPr>
+          <p:nvPr/>
+        </p:nvPicPr>
+        <p:blipFill>
+          <a:blip r:embed="rId2" cstate="print">
+            <a:duotone>
+              <a:schemeClr val="accent2">
+                <a:shade val="45000"/>
+                <a:satMod val="135000"/>
+              </a:schemeClr>
+              <a:prstClr val="white"/>
+            </a:duotone>
+            <a:extLst>
+              <a:ext uri="{28A0092B-C50C-407E-A947-70E740481C1C}">
+                <a14:useLocalDpi xmlns:a14="http://schemas.microsoft.com/office/drawing/2010/main" val="0"/>
+              </a:ext>
+            </a:extLst>
+          </a:blip>
+          <a:srcRect/>
+          <a:stretch>
+            <a:fillRect/>
+          </a:stretch>
+        </p:blipFill>
+        <p:spPr bwMode="auto">
+          <a:xfrm>
+            <a:off x="10257855" y="3256453"/>
+            <a:ext cx="1080000" cy="1080000"/>
+          </a:xfrm>
+          <a:prstGeom prst="rect">
+            <a:avLst/>
+          </a:prstGeom>
+          <a:noFill/>
+          <a:extLst>
+            <a:ext uri="{909E8E84-426E-40DD-AFC4-6F175D3DCCD1}">
+              <a14:hiddenFill xmlns:a14="http://schemas.microsoft.com/office/drawing/2010/main">
+                <a:solidFill>
+                  <a:srgbClr val="FFFFFF"/>
+                </a:solidFill>
+              </a14:hiddenFill>
+            </a:ext>
+          </a:extLst>
+        </p:spPr>
+      </p:pic>
+      <p:pic>
+        <p:nvPicPr>
+          <p:cNvPr id="15" name="Picture 8" descr="Billedresultat for handling icon"/>
+          <p:cNvPicPr>
+            <a:picLocks noChangeAspect="1" noChangeArrowheads="1"/>
+          </p:cNvPicPr>
+          <p:nvPr/>
+        </p:nvPicPr>
+        <p:blipFill>
+          <a:blip r:embed="rId3" cstate="print">
+            <a:duotone>
+              <a:schemeClr val="bg2">
+                <a:shade val="45000"/>
+                <a:satMod val="135000"/>
+              </a:schemeClr>
+              <a:prstClr val="white"/>
+            </a:duotone>
+            <a:extLst>
+              <a:ext uri="{28A0092B-C50C-407E-A947-70E740481C1C}">
+                <a14:useLocalDpi xmlns:a14="http://schemas.microsoft.com/office/drawing/2010/main" val="0"/>
+              </a:ext>
+            </a:extLst>
+          </a:blip>
+          <a:srcRect/>
+          <a:stretch>
+            <a:fillRect/>
+          </a:stretch>
+        </p:blipFill>
+        <p:spPr bwMode="auto">
+          <a:xfrm>
+            <a:off x="1589024" y="4950995"/>
+            <a:ext cx="1088904" cy="1088904"/>
+          </a:xfrm>
+          <a:prstGeom prst="rect">
+            <a:avLst/>
+          </a:prstGeom>
+          <a:noFill/>
+          <a:extLst>
+            <a:ext uri="{909E8E84-426E-40DD-AFC4-6F175D3DCCD1}">
+              <a14:hiddenFill xmlns:a14="http://schemas.microsoft.com/office/drawing/2010/main">
+                <a:solidFill>
+                  <a:srgbClr val="FFFFFF"/>
+                </a:solidFill>
+              </a14:hiddenFill>
+            </a:ext>
+          </a:extLst>
+        </p:spPr>
+      </p:pic>
+      <p:pic>
+        <p:nvPicPr>
+          <p:cNvPr id="16" name="Picture 8" descr="Billedresultat for handling icon"/>
+          <p:cNvPicPr>
+            <a:picLocks noChangeAspect="1" noChangeArrowheads="1"/>
+          </p:cNvPicPr>
+          <p:nvPr/>
+        </p:nvPicPr>
+        <p:blipFill>
+          <a:blip r:embed="rId3" cstate="print">
+            <a:duotone>
+              <a:schemeClr val="bg2">
+                <a:shade val="45000"/>
+                <a:satMod val="135000"/>
+              </a:schemeClr>
+              <a:prstClr val="white"/>
+            </a:duotone>
+            <a:extLst>
+              <a:ext uri="{28A0092B-C50C-407E-A947-70E740481C1C}">
+                <a14:useLocalDpi xmlns:a14="http://schemas.microsoft.com/office/drawing/2010/main" val="0"/>
+              </a:ext>
+            </a:extLst>
+          </a:blip>
+          <a:srcRect/>
+          <a:stretch>
+            <a:fillRect/>
+          </a:stretch>
+        </p:blipFill>
+        <p:spPr bwMode="auto">
+          <a:xfrm>
+            <a:off x="6419710" y="4950995"/>
+            <a:ext cx="1088904" cy="1088904"/>
+          </a:xfrm>
+          <a:prstGeom prst="rect">
+            <a:avLst/>
+          </a:prstGeom>
+          <a:noFill/>
+          <a:extLst>
+            <a:ext uri="{909E8E84-426E-40DD-AFC4-6F175D3DCCD1}">
+              <a14:hiddenFill xmlns:a14="http://schemas.microsoft.com/office/drawing/2010/main">
+                <a:solidFill>
+                  <a:srgbClr val="FFFFFF"/>
+                </a:solidFill>
+              </a14:hiddenFill>
+            </a:ext>
+          </a:extLst>
+        </p:spPr>
+      </p:pic>
+    </p:spTree>
+    <p:extLst>
+      <p:ext uri="{BB962C8B-B14F-4D97-AF65-F5344CB8AC3E}">
+        <p14:creationId xmlns:p14="http://schemas.microsoft.com/office/powerpoint/2010/main" val="2984342234"/>
       </p:ext>
     </p:extLst>
   </p:cSld>
@@ -11927,484 +11943,307 @@
       </p:grpSpPr>
       <p:sp>
         <p:nvSpPr>
-          <p:cNvPr id="2" name="Afrundet rektangel 1"/>
-          <p:cNvSpPr/>
+          <p:cNvPr id="11" name="Tekstfelt 10"/>
+          <p:cNvSpPr txBox="1"/>
           <p:nvPr/>
         </p:nvSpPr>
         <p:spPr>
           <a:xfrm>
-            <a:off x="1359570" y="511340"/>
-            <a:ext cx="1588168" cy="5793205"/>
-          </a:xfrm>
-          <a:prstGeom prst="roundRect">
-            <a:avLst/>
-          </a:prstGeom>
-          <a:solidFill>
-            <a:schemeClr val="accent6">
-              <a:lumMod val="75000"/>
-            </a:schemeClr>
-          </a:solidFill>
-        </p:spPr>
-        <p:style>
-          <a:lnRef idx="2">
-            <a:schemeClr val="accent1">
-              <a:shade val="50000"/>
-            </a:schemeClr>
-          </a:lnRef>
-          <a:fillRef idx="1">
-            <a:schemeClr val="accent1"/>
-          </a:fillRef>
-          <a:effectRef idx="0">
-            <a:schemeClr val="accent1"/>
-          </a:effectRef>
-          <a:fontRef idx="minor">
-            <a:schemeClr val="lt1"/>
-          </a:fontRef>
-        </p:style>
-        <p:txBody>
-          <a:bodyPr rtlCol="0" anchor="t"/>
-          <a:lstStyle/>
-          <a:p>
-            <a:r>
-              <a:rPr lang="da-DK" sz="2400" smtClean="0"/>
-              <a:t>Bank</a:t>
-            </a:r>
-          </a:p>
-          <a:p>
-            <a:r>
-              <a:rPr lang="da-DK" sz="2400" smtClean="0"/>
-              <a:t>GUI</a:t>
-            </a:r>
-            <a:endParaRPr lang="da-DK" sz="2400"/>
-          </a:p>
-        </p:txBody>
-      </p:sp>
-      <p:sp>
-        <p:nvSpPr>
-          <p:cNvPr id="8" name="Afrundet rektangel 7"/>
-          <p:cNvSpPr/>
-          <p:nvPr/>
-        </p:nvSpPr>
-        <p:spPr>
-          <a:xfrm>
-            <a:off x="3753943" y="511340"/>
-            <a:ext cx="1588168" cy="5793205"/>
-          </a:xfrm>
-          <a:prstGeom prst="roundRect">
-            <a:avLst/>
-          </a:prstGeom>
-          <a:solidFill>
-            <a:schemeClr val="accent6">
-              <a:lumMod val="75000"/>
-            </a:schemeClr>
-          </a:solidFill>
-        </p:spPr>
-        <p:style>
-          <a:lnRef idx="2">
-            <a:schemeClr val="accent1">
-              <a:shade val="50000"/>
-            </a:schemeClr>
-          </a:lnRef>
-          <a:fillRef idx="1">
-            <a:schemeClr val="accent1"/>
-          </a:fillRef>
-          <a:effectRef idx="0">
-            <a:schemeClr val="accent1"/>
-          </a:effectRef>
-          <a:fontRef idx="minor">
-            <a:schemeClr val="lt1"/>
-          </a:fontRef>
-        </p:style>
-        <p:txBody>
-          <a:bodyPr rtlCol="0" anchor="t"/>
-          <a:lstStyle/>
-          <a:p>
-            <a:r>
-              <a:rPr lang="da-DK" sz="2400" smtClean="0"/>
-              <a:t>Bank</a:t>
-            </a:r>
-          </a:p>
-          <a:p>
-            <a:r>
-              <a:rPr lang="da-DK" sz="2400" smtClean="0"/>
-              <a:t>Model</a:t>
-            </a:r>
-            <a:endParaRPr lang="da-DK" sz="2400"/>
-          </a:p>
-        </p:txBody>
-      </p:sp>
-      <p:cxnSp>
-        <p:nvCxnSpPr>
-          <p:cNvPr id="6" name="Lige pilforbindelse 5"/>
-          <p:cNvCxnSpPr/>
-          <p:nvPr/>
-        </p:nvCxnSpPr>
-        <p:spPr>
-          <a:xfrm>
-            <a:off x="2594187" y="2181013"/>
-            <a:ext cx="1889760" cy="0"/>
-          </a:xfrm>
-          <a:prstGeom prst="straightConnector1">
-            <a:avLst/>
-          </a:prstGeom>
-          <a:ln w="76200">
-            <a:solidFill>
-              <a:srgbClr val="FFC000"/>
-            </a:solidFill>
-            <a:tailEnd type="triangle" w="lg" len="lg"/>
-          </a:ln>
-        </p:spPr>
-        <p:style>
-          <a:lnRef idx="1">
-            <a:schemeClr val="accent1"/>
-          </a:lnRef>
-          <a:fillRef idx="0">
-            <a:schemeClr val="accent1"/>
-          </a:fillRef>
-          <a:effectRef idx="0">
-            <a:schemeClr val="accent1"/>
-          </a:effectRef>
-          <a:fontRef idx="minor">
-            <a:schemeClr val="tx1"/>
-          </a:fontRef>
-        </p:style>
-      </p:cxnSp>
-      <p:sp>
-        <p:nvSpPr>
-          <p:cNvPr id="10" name="Afrundet rektangel 9"/>
-          <p:cNvSpPr/>
-          <p:nvPr/>
-        </p:nvSpPr>
-        <p:spPr>
-          <a:xfrm>
-            <a:off x="6148316" y="511340"/>
-            <a:ext cx="1588168" cy="5793205"/>
-          </a:xfrm>
-          <a:prstGeom prst="roundRect">
-            <a:avLst/>
-          </a:prstGeom>
-          <a:solidFill>
-            <a:schemeClr val="accent6">
-              <a:lumMod val="75000"/>
-            </a:schemeClr>
-          </a:solidFill>
-        </p:spPr>
-        <p:style>
-          <a:lnRef idx="2">
-            <a:schemeClr val="accent1">
-              <a:shade val="50000"/>
-            </a:schemeClr>
-          </a:lnRef>
-          <a:fillRef idx="1">
-            <a:schemeClr val="accent1"/>
-          </a:fillRef>
-          <a:effectRef idx="0">
-            <a:schemeClr val="accent1"/>
-          </a:effectRef>
-          <a:fontRef idx="minor">
-            <a:schemeClr val="lt1"/>
-          </a:fontRef>
-        </p:style>
-        <p:txBody>
-          <a:bodyPr rtlCol="0" anchor="t"/>
-          <a:lstStyle/>
-          <a:p>
-            <a:r>
-              <a:rPr lang="da-DK" sz="2400" smtClean="0"/>
-              <a:t>Bank</a:t>
-            </a:r>
-          </a:p>
-          <a:p>
-            <a:r>
-              <a:rPr lang="da-DK" sz="2400" smtClean="0"/>
-              <a:t>Account</a:t>
-            </a:r>
-          </a:p>
-          <a:p>
-            <a:r>
-              <a:rPr lang="da-DK" sz="2400" smtClean="0"/>
-              <a:t>Collection</a:t>
-            </a:r>
-            <a:endParaRPr lang="da-DK" sz="2400"/>
-          </a:p>
-        </p:txBody>
-      </p:sp>
-      <p:sp>
-        <p:nvSpPr>
-          <p:cNvPr id="11" name="Afrundet rektangel 10"/>
-          <p:cNvSpPr/>
-          <p:nvPr/>
-        </p:nvSpPr>
-        <p:spPr>
-          <a:xfrm>
-            <a:off x="8542689" y="511339"/>
-            <a:ext cx="1588168" cy="5793205"/>
-          </a:xfrm>
-          <a:prstGeom prst="roundRect">
-            <a:avLst/>
-          </a:prstGeom>
-          <a:solidFill>
-            <a:schemeClr val="accent6">
-              <a:lumMod val="75000"/>
-            </a:schemeClr>
-          </a:solidFill>
-        </p:spPr>
-        <p:style>
-          <a:lnRef idx="2">
-            <a:schemeClr val="accent1">
-              <a:shade val="50000"/>
-            </a:schemeClr>
-          </a:lnRef>
-          <a:fillRef idx="1">
-            <a:schemeClr val="accent1"/>
-          </a:fillRef>
-          <a:effectRef idx="0">
-            <a:schemeClr val="accent1"/>
-          </a:effectRef>
-          <a:fontRef idx="minor">
-            <a:schemeClr val="lt1"/>
-          </a:fontRef>
-        </p:style>
-        <p:txBody>
-          <a:bodyPr rtlCol="0" anchor="t"/>
-          <a:lstStyle/>
-          <a:p>
-            <a:r>
-              <a:rPr lang="da-DK" sz="2400" smtClean="0"/>
-              <a:t>Bank</a:t>
-            </a:r>
-          </a:p>
-          <a:p>
-            <a:r>
-              <a:rPr lang="da-DK" sz="2400" smtClean="0"/>
-              <a:t>Account</a:t>
-            </a:r>
-          </a:p>
-          <a:p>
-            <a:endParaRPr lang="da-DK" sz="2400"/>
-          </a:p>
-        </p:txBody>
-      </p:sp>
-      <p:cxnSp>
-        <p:nvCxnSpPr>
-          <p:cNvPr id="12" name="Lige pilforbindelse 11"/>
-          <p:cNvCxnSpPr/>
-          <p:nvPr/>
-        </p:nvCxnSpPr>
-        <p:spPr>
-          <a:xfrm>
-            <a:off x="4805680" y="2929467"/>
-            <a:ext cx="1889760" cy="0"/>
-          </a:xfrm>
-          <a:prstGeom prst="straightConnector1">
-            <a:avLst/>
-          </a:prstGeom>
-          <a:ln w="76200">
-            <a:solidFill>
-              <a:srgbClr val="FFC000"/>
-            </a:solidFill>
-            <a:tailEnd type="triangle" w="lg" len="lg"/>
-          </a:ln>
-        </p:spPr>
-        <p:style>
-          <a:lnRef idx="1">
-            <a:schemeClr val="accent1"/>
-          </a:lnRef>
-          <a:fillRef idx="0">
-            <a:schemeClr val="accent1"/>
-          </a:fillRef>
-          <a:effectRef idx="0">
-            <a:schemeClr val="accent1"/>
-          </a:effectRef>
-          <a:fontRef idx="minor">
-            <a:schemeClr val="tx1"/>
-          </a:fontRef>
-        </p:style>
-      </p:cxnSp>
-      <p:cxnSp>
-        <p:nvCxnSpPr>
-          <p:cNvPr id="13" name="Lige pilforbindelse 12"/>
-          <p:cNvCxnSpPr/>
-          <p:nvPr/>
-        </p:nvCxnSpPr>
-        <p:spPr>
-          <a:xfrm>
-            <a:off x="7223760" y="3796453"/>
-            <a:ext cx="1889760" cy="0"/>
-          </a:xfrm>
-          <a:prstGeom prst="straightConnector1">
-            <a:avLst/>
-          </a:prstGeom>
-          <a:ln w="76200">
-            <a:solidFill>
-              <a:srgbClr val="FFC000"/>
-            </a:solidFill>
-            <a:tailEnd type="triangle" w="lg" len="lg"/>
-          </a:ln>
-        </p:spPr>
-        <p:style>
-          <a:lnRef idx="1">
-            <a:schemeClr val="accent1"/>
-          </a:lnRef>
-          <a:fillRef idx="0">
-            <a:schemeClr val="accent1"/>
-          </a:fillRef>
-          <a:effectRef idx="0">
-            <a:schemeClr val="accent1"/>
-          </a:effectRef>
-          <a:fontRef idx="minor">
-            <a:schemeClr val="tx1"/>
-          </a:fontRef>
-        </p:style>
-      </p:cxnSp>
-      <p:pic>
-        <p:nvPicPr>
-          <p:cNvPr id="14" name="Picture 4" descr="Billedresultat for signaling icon"/>
-          <p:cNvPicPr>
-            <a:picLocks noChangeAspect="1" noChangeArrowheads="1"/>
-          </p:cNvPicPr>
-          <p:nvPr/>
-        </p:nvPicPr>
-        <p:blipFill>
-          <a:blip r:embed="rId2" cstate="print">
-            <a:duotone>
-              <a:schemeClr val="accent2">
-                <a:shade val="45000"/>
-                <a:satMod val="135000"/>
-              </a:schemeClr>
-              <a:prstClr val="white"/>
-            </a:duotone>
-            <a:extLst>
-              <a:ext uri="{28A0092B-C50C-407E-A947-70E740481C1C}">
-                <a14:useLocalDpi xmlns:a14="http://schemas.microsoft.com/office/drawing/2010/main" val="0"/>
-              </a:ext>
-            </a:extLst>
-          </a:blip>
-          <a:srcRect/>
-          <a:stretch>
-            <a:fillRect/>
-          </a:stretch>
-        </p:blipFill>
-        <p:spPr bwMode="auto">
-          <a:xfrm>
-            <a:off x="10257855" y="3256453"/>
-            <a:ext cx="1080000" cy="1080000"/>
+            <a:off x="925057" y="668956"/>
+            <a:ext cx="9572496" cy="5016758"/>
           </a:xfrm>
           <a:prstGeom prst="rect">
             <a:avLst/>
           </a:prstGeom>
           <a:noFill/>
-          <a:extLst>
-            <a:ext uri="{909E8E84-426E-40DD-AFC4-6F175D3DCCD1}">
-              <a14:hiddenFill xmlns:a14="http://schemas.microsoft.com/office/drawing/2010/main">
-                <a:solidFill>
-                  <a:srgbClr val="FFFFFF"/>
-                </a:solidFill>
-              </a14:hiddenFill>
-            </a:ext>
-          </a:extLst>
-        </p:spPr>
-      </p:pic>
-      <p:pic>
-        <p:nvPicPr>
-          <p:cNvPr id="15" name="Picture 8" descr="Billedresultat for handling icon"/>
-          <p:cNvPicPr>
-            <a:picLocks noChangeAspect="1" noChangeArrowheads="1"/>
-          </p:cNvPicPr>
-          <p:nvPr/>
-        </p:nvPicPr>
-        <p:blipFill>
-          <a:blip r:embed="rId3" cstate="print">
-            <a:duotone>
-              <a:schemeClr val="bg2">
-                <a:shade val="45000"/>
-                <a:satMod val="135000"/>
-              </a:schemeClr>
-              <a:prstClr val="white"/>
-            </a:duotone>
-            <a:extLst>
-              <a:ext uri="{28A0092B-C50C-407E-A947-70E740481C1C}">
-                <a14:useLocalDpi xmlns:a14="http://schemas.microsoft.com/office/drawing/2010/main" val="0"/>
-              </a:ext>
-            </a:extLst>
-          </a:blip>
-          <a:srcRect/>
-          <a:stretch>
-            <a:fillRect/>
-          </a:stretch>
-        </p:blipFill>
-        <p:spPr bwMode="auto">
-          <a:xfrm>
-            <a:off x="1589024" y="4950995"/>
-            <a:ext cx="1088904" cy="1088904"/>
-          </a:xfrm>
-          <a:prstGeom prst="rect">
-            <a:avLst/>
-          </a:prstGeom>
-          <a:noFill/>
-          <a:extLst>
-            <a:ext uri="{909E8E84-426E-40DD-AFC4-6F175D3DCCD1}">
-              <a14:hiddenFill xmlns:a14="http://schemas.microsoft.com/office/drawing/2010/main">
-                <a:solidFill>
-                  <a:srgbClr val="FFFFFF"/>
-                </a:solidFill>
-              </a14:hiddenFill>
-            </a:ext>
-          </a:extLst>
-        </p:spPr>
-      </p:pic>
-      <p:pic>
-        <p:nvPicPr>
-          <p:cNvPr id="16" name="Picture 8" descr="Billedresultat for handling icon"/>
-          <p:cNvPicPr>
-            <a:picLocks noChangeAspect="1" noChangeArrowheads="1"/>
-          </p:cNvPicPr>
-          <p:nvPr/>
-        </p:nvPicPr>
-        <p:blipFill>
-          <a:blip r:embed="rId3" cstate="print">
-            <a:duotone>
-              <a:schemeClr val="bg2">
-                <a:shade val="45000"/>
-                <a:satMod val="135000"/>
-              </a:schemeClr>
-              <a:prstClr val="white"/>
-            </a:duotone>
-            <a:extLst>
-              <a:ext uri="{28A0092B-C50C-407E-A947-70E740481C1C}">
-                <a14:useLocalDpi xmlns:a14="http://schemas.microsoft.com/office/drawing/2010/main" val="0"/>
-              </a:ext>
-            </a:extLst>
-          </a:blip>
-          <a:srcRect/>
-          <a:stretch>
-            <a:fillRect/>
-          </a:stretch>
-        </p:blipFill>
-        <p:spPr bwMode="auto">
-          <a:xfrm>
-            <a:off x="6419710" y="4950995"/>
-            <a:ext cx="1088904" cy="1088904"/>
-          </a:xfrm>
-          <a:prstGeom prst="rect">
-            <a:avLst/>
-          </a:prstGeom>
-          <a:noFill/>
-          <a:extLst>
-            <a:ext uri="{909E8E84-426E-40DD-AFC4-6F175D3DCCD1}">
-              <a14:hiddenFill xmlns:a14="http://schemas.microsoft.com/office/drawing/2010/main">
-                <a:solidFill>
-                  <a:srgbClr val="FFFFFF"/>
-                </a:solidFill>
-              </a14:hiddenFill>
-            </a:ext>
-          </a:extLst>
-        </p:spPr>
-      </p:pic>
+        </p:spPr>
+        <p:txBody>
+          <a:bodyPr wrap="square" rtlCol="0">
+            <a:spAutoFit/>
+          </a:bodyPr>
+          <a:lstStyle/>
+          <a:p>
+            <a:r>
+              <a:rPr lang="da-DK" sz="2000" b="1" smtClean="0">
+                <a:solidFill>
+                  <a:srgbClr val="0070C0"/>
+                </a:solidFill>
+                <a:latin typeface="Consolas" panose="020B0609020204030204" pitchFamily="49" charset="0"/>
+              </a:rPr>
+              <a:t>public </a:t>
+            </a:r>
+            <a:r>
+              <a:rPr lang="da-DK" sz="2000" b="1">
+                <a:solidFill>
+                  <a:srgbClr val="0070C0"/>
+                </a:solidFill>
+                <a:latin typeface="Consolas" panose="020B0609020204030204" pitchFamily="49" charset="0"/>
+              </a:rPr>
+              <a:t>void </a:t>
+            </a:r>
+            <a:r>
+              <a:rPr lang="da-DK" sz="2000" b="1" smtClean="0">
+                <a:latin typeface="Consolas" panose="020B0609020204030204" pitchFamily="49" charset="0"/>
+              </a:rPr>
+              <a:t>DepositHandler(</a:t>
+            </a:r>
+            <a:r>
+              <a:rPr lang="da-DK" sz="2000" b="1">
+                <a:solidFill>
+                  <a:srgbClr val="0070C0"/>
+                </a:solidFill>
+                <a:latin typeface="Consolas" panose="020B0609020204030204" pitchFamily="49" charset="0"/>
+              </a:rPr>
+              <a:t>int</a:t>
+            </a:r>
+            <a:r>
+              <a:rPr lang="da-DK" sz="2000" b="1" smtClean="0">
+                <a:latin typeface="Consolas" panose="020B0609020204030204" pitchFamily="49" charset="0"/>
+              </a:rPr>
+              <a:t> accountNo)</a:t>
+            </a:r>
+          </a:p>
+          <a:p>
+            <a:r>
+              <a:rPr lang="da-DK" sz="2000" b="1" smtClean="0">
+                <a:latin typeface="Consolas" panose="020B0609020204030204" pitchFamily="49" charset="0"/>
+              </a:rPr>
+              <a:t>{</a:t>
+            </a:r>
+          </a:p>
+          <a:p>
+            <a:r>
+              <a:rPr lang="da-DK" sz="2000" b="1" smtClean="0">
+                <a:latin typeface="Consolas" panose="020B0609020204030204" pitchFamily="49" charset="0"/>
+              </a:rPr>
+              <a:t>    </a:t>
+            </a:r>
+            <a:r>
+              <a:rPr lang="da-DK" sz="2000" b="1">
+                <a:solidFill>
+                  <a:srgbClr val="0070C0"/>
+                </a:solidFill>
+                <a:latin typeface="Consolas" panose="020B0609020204030204" pitchFamily="49" charset="0"/>
+              </a:rPr>
+              <a:t>double</a:t>
+            </a:r>
+            <a:r>
+              <a:rPr lang="da-DK" sz="2000" b="1" smtClean="0">
+                <a:latin typeface="Consolas" panose="020B0609020204030204" pitchFamily="49" charset="0"/>
+              </a:rPr>
+              <a:t> amount = GetDepositAmount(…);</a:t>
+            </a:r>
+          </a:p>
+          <a:p>
+            <a:endParaRPr lang="da-DK" sz="2000" b="1" smtClean="0">
+              <a:latin typeface="Consolas" panose="020B0609020204030204" pitchFamily="49" charset="0"/>
+            </a:endParaRPr>
+          </a:p>
+          <a:p>
+            <a:r>
+              <a:rPr lang="en-US" sz="2000" b="1" smtClean="0">
+                <a:solidFill>
+                  <a:srgbClr val="0070C0"/>
+                </a:solidFill>
+                <a:latin typeface="Consolas" panose="020B0609020204030204" pitchFamily="49" charset="0"/>
+              </a:rPr>
+              <a:t>    try</a:t>
+            </a:r>
+            <a:endParaRPr lang="da-DK" sz="2000" b="1">
+              <a:solidFill>
+                <a:srgbClr val="0070C0"/>
+              </a:solidFill>
+              <a:latin typeface="Consolas" panose="020B0609020204030204" pitchFamily="49" charset="0"/>
+            </a:endParaRPr>
+          </a:p>
+          <a:p>
+            <a:r>
+              <a:rPr lang="en-US" sz="2000" b="1" smtClean="0">
+                <a:latin typeface="Consolas" panose="020B0609020204030204" pitchFamily="49" charset="0"/>
+              </a:rPr>
+              <a:t>    {</a:t>
+            </a:r>
+            <a:endParaRPr lang="da-DK" sz="2000" b="1">
+              <a:latin typeface="Consolas" panose="020B0609020204030204" pitchFamily="49" charset="0"/>
+            </a:endParaRPr>
+          </a:p>
+          <a:p>
+            <a:r>
+              <a:rPr lang="en-US" sz="2000" b="1" smtClean="0">
+                <a:latin typeface="Consolas" panose="020B0609020204030204" pitchFamily="49" charset="0"/>
+              </a:rPr>
+              <a:t>        bankModel.Deposit(accountNo, amount);</a:t>
+            </a:r>
+            <a:endParaRPr lang="da-DK" sz="2000" b="1">
+              <a:latin typeface="Consolas" panose="020B0609020204030204" pitchFamily="49" charset="0"/>
+            </a:endParaRPr>
+          </a:p>
+          <a:p>
+            <a:r>
+              <a:rPr lang="en-US" sz="2000" b="1" smtClean="0">
+                <a:latin typeface="Consolas" panose="020B0609020204030204" pitchFamily="49" charset="0"/>
+              </a:rPr>
+              <a:t>    }</a:t>
+            </a:r>
+            <a:endParaRPr lang="da-DK" sz="2000" b="1">
+              <a:latin typeface="Consolas" panose="020B0609020204030204" pitchFamily="49" charset="0"/>
+            </a:endParaRPr>
+          </a:p>
+          <a:p>
+            <a:r>
+              <a:rPr lang="en-US" sz="2000" b="1" smtClean="0">
+                <a:latin typeface="Consolas" panose="020B0609020204030204" pitchFamily="49" charset="0"/>
+              </a:rPr>
+              <a:t>    </a:t>
+            </a:r>
+            <a:r>
+              <a:rPr lang="en-US" sz="2000" b="1">
+                <a:solidFill>
+                  <a:srgbClr val="0070C0"/>
+                </a:solidFill>
+                <a:latin typeface="Consolas" panose="020B0609020204030204" pitchFamily="49" charset="0"/>
+              </a:rPr>
+              <a:t>catch</a:t>
+            </a:r>
+            <a:r>
+              <a:rPr lang="en-US" sz="2000" b="1" smtClean="0">
+                <a:latin typeface="Consolas" panose="020B0609020204030204" pitchFamily="49" charset="0"/>
+              </a:rPr>
+              <a:t> (</a:t>
+            </a:r>
+            <a:r>
+              <a:rPr lang="en-US" sz="2000" b="1" smtClean="0">
+                <a:solidFill>
+                  <a:schemeClr val="accent6">
+                    <a:lumMod val="75000"/>
+                  </a:schemeClr>
+                </a:solidFill>
+                <a:latin typeface="Consolas" panose="020B0609020204030204" pitchFamily="49" charset="0"/>
+              </a:rPr>
+              <a:t>Exception</a:t>
+            </a:r>
+            <a:r>
+              <a:rPr lang="en-US" sz="2000" b="1" smtClean="0">
+                <a:latin typeface="Consolas" panose="020B0609020204030204" pitchFamily="49" charset="0"/>
+              </a:rPr>
+              <a:t> e)</a:t>
+            </a:r>
+            <a:endParaRPr lang="da-DK" sz="2000" b="1">
+              <a:latin typeface="Consolas" panose="020B0609020204030204" pitchFamily="49" charset="0"/>
+            </a:endParaRPr>
+          </a:p>
+          <a:p>
+            <a:r>
+              <a:rPr lang="en-US" sz="2000" b="1" smtClean="0">
+                <a:latin typeface="Consolas" panose="020B0609020204030204" pitchFamily="49" charset="0"/>
+              </a:rPr>
+              <a:t>    {</a:t>
+            </a:r>
+            <a:endParaRPr lang="da-DK" sz="2000" b="1">
+              <a:latin typeface="Consolas" panose="020B0609020204030204" pitchFamily="49" charset="0"/>
+            </a:endParaRPr>
+          </a:p>
+          <a:p>
+            <a:r>
+              <a:rPr lang="en-US" sz="2000" b="1" smtClean="0">
+                <a:latin typeface="Consolas" panose="020B0609020204030204" pitchFamily="49" charset="0"/>
+              </a:rPr>
+              <a:t>        errorHandler.Handle(</a:t>
+            </a:r>
+            <a:r>
+              <a:rPr lang="en-US" sz="2000" b="1" smtClean="0">
+                <a:solidFill>
+                  <a:schemeClr val="accent6">
+                    <a:lumMod val="75000"/>
+                  </a:schemeClr>
+                </a:solidFill>
+                <a:latin typeface="Consolas" panose="020B0609020204030204" pitchFamily="49" charset="0"/>
+              </a:rPr>
+              <a:t>Action</a:t>
+            </a:r>
+            <a:r>
+              <a:rPr lang="en-US" sz="2000" b="1" smtClean="0">
+                <a:latin typeface="Consolas" panose="020B0609020204030204" pitchFamily="49" charset="0"/>
+              </a:rPr>
+              <a:t>.Deposit, e);</a:t>
+            </a:r>
+          </a:p>
+          <a:p>
+            <a:r>
+              <a:rPr lang="en-US" sz="2000" b="1">
+                <a:latin typeface="Consolas" panose="020B0609020204030204" pitchFamily="49" charset="0"/>
+              </a:rPr>
+              <a:t> </a:t>
+            </a:r>
+            <a:r>
+              <a:rPr lang="en-US" sz="2000" b="1" smtClean="0">
+                <a:latin typeface="Consolas" panose="020B0609020204030204" pitchFamily="49" charset="0"/>
+              </a:rPr>
+              <a:t>       </a:t>
+            </a:r>
+            <a:r>
+              <a:rPr lang="en-US" sz="2000" b="1">
+                <a:solidFill>
+                  <a:srgbClr val="FF0000"/>
+                </a:solidFill>
+                <a:latin typeface="Consolas" panose="020B0609020204030204" pitchFamily="49" charset="0"/>
+              </a:rPr>
+              <a:t>throw</a:t>
+            </a:r>
+            <a:r>
+              <a:rPr lang="en-US" sz="2000" b="1" smtClean="0">
+                <a:solidFill>
+                  <a:srgbClr val="FF0000"/>
+                </a:solidFill>
+                <a:latin typeface="Consolas" panose="020B0609020204030204" pitchFamily="49" charset="0"/>
+              </a:rPr>
+              <a:t>;</a:t>
+            </a:r>
+          </a:p>
+          <a:p>
+            <a:r>
+              <a:rPr lang="en-US" sz="2000" b="1">
+                <a:latin typeface="Consolas" panose="020B0609020204030204" pitchFamily="49" charset="0"/>
+              </a:rPr>
+              <a:t> </a:t>
+            </a:r>
+            <a:r>
+              <a:rPr lang="en-US" sz="2000" b="1" smtClean="0">
+                <a:latin typeface="Consolas" panose="020B0609020204030204" pitchFamily="49" charset="0"/>
+              </a:rPr>
+              <a:t>   }</a:t>
+            </a:r>
+            <a:endParaRPr lang="da-DK" sz="2000" b="1">
+              <a:latin typeface="Consolas" panose="020B0609020204030204" pitchFamily="49" charset="0"/>
+            </a:endParaRPr>
+          </a:p>
+          <a:p>
+            <a:endParaRPr lang="da-DK" sz="2000" b="1">
+              <a:latin typeface="Consolas" panose="020B0609020204030204" pitchFamily="49" charset="0"/>
+            </a:endParaRPr>
+          </a:p>
+          <a:p>
+            <a:r>
+              <a:rPr lang="da-DK" sz="2000" b="1" smtClean="0">
+                <a:latin typeface="Consolas" panose="020B0609020204030204" pitchFamily="49" charset="0"/>
+              </a:rPr>
+              <a:t>    …</a:t>
+            </a:r>
+          </a:p>
+          <a:p>
+            <a:r>
+              <a:rPr lang="da-DK" sz="2000" b="1" smtClean="0">
+                <a:latin typeface="Consolas" panose="020B0609020204030204" pitchFamily="49" charset="0"/>
+              </a:rPr>
+              <a:t>}</a:t>
+            </a:r>
+          </a:p>
+        </p:txBody>
+      </p:sp>
     </p:spTree>
     <p:extLst>
       <p:ext uri="{BB962C8B-B14F-4D97-AF65-F5344CB8AC3E}">
-        <p14:creationId xmlns:p14="http://schemas.microsoft.com/office/powerpoint/2010/main" val="2984342234"/>
+        <p14:creationId xmlns:p14="http://schemas.microsoft.com/office/powerpoint/2010/main" val="2082888062"/>
       </p:ext>
     </p:extLst>
   </p:cSld>
@@ -12413,14 +12252,10 @@
   </p:clrMapOvr>
   <mc:AlternateContent xmlns:mc="http://schemas.openxmlformats.org/markup-compatibility/2006" xmlns:p14="http://schemas.microsoft.com/office/powerpoint/2010/main">
     <mc:Choice Requires="p14">
-      <p:transition spd="med" p14:dur="700">
-        <p:fade/>
-      </p:transition>
+      <p:transition p14:dur="0"/>
     </mc:Choice>
     <mc:Fallback xmlns="">
-      <p:transition spd="med">
-        <p:fade/>
-      </p:transition>
+      <p:transition/>
     </mc:Fallback>
   </mc:AlternateContent>
   <p:timing>
@@ -12452,324 +12287,80 @@
       </p:grpSpPr>
       <p:sp>
         <p:nvSpPr>
-          <p:cNvPr id="11" name="Tekstfelt 10"/>
-          <p:cNvSpPr txBox="1"/>
-          <p:nvPr/>
+          <p:cNvPr id="2" name="Titel 1"/>
+          <p:cNvSpPr>
+            <a:spLocks noGrp="1"/>
+          </p:cNvSpPr>
+          <p:nvPr>
+            <p:ph type="title"/>
+          </p:nvPr>
         </p:nvSpPr>
-        <p:spPr>
-          <a:xfrm>
-            <a:off x="925057" y="668956"/>
-            <a:ext cx="9572496" cy="5016758"/>
-          </a:xfrm>
-          <a:prstGeom prst="rect">
-            <a:avLst/>
-          </a:prstGeom>
-          <a:noFill/>
-        </p:spPr>
+        <p:spPr/>
         <p:txBody>
-          <a:bodyPr wrap="square" rtlCol="0">
-            <a:spAutoFit/>
-          </a:bodyPr>
+          <a:bodyPr/>
           <a:lstStyle/>
           <a:p>
             <a:r>
-              <a:rPr lang="da-DK" sz="2000" b="1" smtClean="0">
-                <a:solidFill>
-                  <a:srgbClr val="0070C0"/>
-                </a:solidFill>
-                <a:latin typeface="Consolas" panose="020B0609020204030204" pitchFamily="49" charset="0"/>
-              </a:rPr>
-              <a:t>public </a:t>
-            </a:r>
-            <a:r>
-              <a:rPr lang="da-DK" sz="2000" b="1">
-                <a:solidFill>
-                  <a:srgbClr val="0070C0"/>
-                </a:solidFill>
-                <a:latin typeface="Consolas" panose="020B0609020204030204" pitchFamily="49" charset="0"/>
-              </a:rPr>
-              <a:t>void </a:t>
-            </a:r>
-            <a:r>
-              <a:rPr lang="da-DK" sz="2000" b="1" smtClean="0">
-                <a:latin typeface="Consolas" panose="020B0609020204030204" pitchFamily="49" charset="0"/>
-              </a:rPr>
-              <a:t>DepositHandler(</a:t>
-            </a:r>
-            <a:r>
-              <a:rPr lang="da-DK" sz="2000" b="1">
-                <a:solidFill>
-                  <a:srgbClr val="0070C0"/>
-                </a:solidFill>
-                <a:latin typeface="Consolas" panose="020B0609020204030204" pitchFamily="49" charset="0"/>
-              </a:rPr>
-              <a:t>int</a:t>
-            </a:r>
-            <a:r>
-              <a:rPr lang="da-DK" sz="2000" b="1" smtClean="0">
-                <a:latin typeface="Consolas" panose="020B0609020204030204" pitchFamily="49" charset="0"/>
-              </a:rPr>
-              <a:t> accountNo)</a:t>
-            </a:r>
-          </a:p>
-          <a:p>
-            <a:r>
-              <a:rPr lang="da-DK" sz="2000" b="1" smtClean="0">
-                <a:latin typeface="Consolas" panose="020B0609020204030204" pitchFamily="49" charset="0"/>
-              </a:rPr>
-              <a:t>{</a:t>
-            </a:r>
-          </a:p>
-          <a:p>
-            <a:r>
-              <a:rPr lang="da-DK" sz="2000" b="1" smtClean="0">
-                <a:latin typeface="Consolas" panose="020B0609020204030204" pitchFamily="49" charset="0"/>
-              </a:rPr>
-              <a:t>    </a:t>
-            </a:r>
-            <a:r>
-              <a:rPr lang="da-DK" sz="2000" b="1">
-                <a:solidFill>
-                  <a:srgbClr val="0070C0"/>
-                </a:solidFill>
-                <a:latin typeface="Consolas" panose="020B0609020204030204" pitchFamily="49" charset="0"/>
-              </a:rPr>
-              <a:t>double</a:t>
-            </a:r>
-            <a:r>
-              <a:rPr lang="da-DK" sz="2000" b="1" smtClean="0">
-                <a:latin typeface="Consolas" panose="020B0609020204030204" pitchFamily="49" charset="0"/>
-              </a:rPr>
-              <a:t> amount = GetDepositAmount(…);</a:t>
-            </a:r>
-          </a:p>
-          <a:p>
-            <a:endParaRPr lang="da-DK" sz="2000" b="1" smtClean="0">
-              <a:latin typeface="Consolas" panose="020B0609020204030204" pitchFamily="49" charset="0"/>
-            </a:endParaRPr>
-          </a:p>
-          <a:p>
-            <a:r>
-              <a:rPr lang="en-US" sz="2000" b="1" smtClean="0">
-                <a:solidFill>
-                  <a:srgbClr val="0070C0"/>
-                </a:solidFill>
-                <a:latin typeface="Consolas" panose="020B0609020204030204" pitchFamily="49" charset="0"/>
-              </a:rPr>
-              <a:t>    try</a:t>
-            </a:r>
-            <a:endParaRPr lang="da-DK" sz="2000" b="1">
-              <a:solidFill>
-                <a:srgbClr val="0070C0"/>
-              </a:solidFill>
-              <a:latin typeface="Consolas" panose="020B0609020204030204" pitchFamily="49" charset="0"/>
-            </a:endParaRPr>
-          </a:p>
-          <a:p>
-            <a:r>
-              <a:rPr lang="en-US" sz="2000" b="1" smtClean="0">
-                <a:latin typeface="Consolas" panose="020B0609020204030204" pitchFamily="49" charset="0"/>
-              </a:rPr>
-              <a:t>    {</a:t>
-            </a:r>
-            <a:endParaRPr lang="da-DK" sz="2000" b="1">
-              <a:latin typeface="Consolas" panose="020B0609020204030204" pitchFamily="49" charset="0"/>
-            </a:endParaRPr>
-          </a:p>
-          <a:p>
-            <a:r>
-              <a:rPr lang="en-US" sz="2000" b="1" smtClean="0">
-                <a:latin typeface="Consolas" panose="020B0609020204030204" pitchFamily="49" charset="0"/>
-              </a:rPr>
-              <a:t>        bankModel.Deposit(accountNo, amount);</a:t>
-            </a:r>
-            <a:endParaRPr lang="da-DK" sz="2000" b="1">
-              <a:latin typeface="Consolas" panose="020B0609020204030204" pitchFamily="49" charset="0"/>
-            </a:endParaRPr>
-          </a:p>
-          <a:p>
-            <a:r>
-              <a:rPr lang="en-US" sz="2000" b="1" smtClean="0">
-                <a:latin typeface="Consolas" panose="020B0609020204030204" pitchFamily="49" charset="0"/>
-              </a:rPr>
-              <a:t>    }</a:t>
-            </a:r>
-            <a:endParaRPr lang="da-DK" sz="2000" b="1">
-              <a:latin typeface="Consolas" panose="020B0609020204030204" pitchFamily="49" charset="0"/>
-            </a:endParaRPr>
-          </a:p>
-          <a:p>
-            <a:r>
-              <a:rPr lang="en-US" sz="2000" b="1" smtClean="0">
-                <a:latin typeface="Consolas" panose="020B0609020204030204" pitchFamily="49" charset="0"/>
-              </a:rPr>
-              <a:t>    </a:t>
-            </a:r>
-            <a:r>
-              <a:rPr lang="en-US" sz="2000" b="1">
-                <a:solidFill>
-                  <a:srgbClr val="0070C0"/>
-                </a:solidFill>
-                <a:latin typeface="Consolas" panose="020B0609020204030204" pitchFamily="49" charset="0"/>
-              </a:rPr>
-              <a:t>catch</a:t>
-            </a:r>
-            <a:r>
-              <a:rPr lang="en-US" sz="2000" b="1" smtClean="0">
-                <a:latin typeface="Consolas" panose="020B0609020204030204" pitchFamily="49" charset="0"/>
-              </a:rPr>
-              <a:t> (</a:t>
-            </a:r>
-            <a:r>
-              <a:rPr lang="en-US" sz="2000" b="1" smtClean="0">
-                <a:solidFill>
-                  <a:schemeClr val="accent6">
-                    <a:lumMod val="75000"/>
-                  </a:schemeClr>
-                </a:solidFill>
-                <a:latin typeface="Consolas" panose="020B0609020204030204" pitchFamily="49" charset="0"/>
-              </a:rPr>
-              <a:t>Exception</a:t>
-            </a:r>
-            <a:r>
-              <a:rPr lang="en-US" sz="2000" b="1" smtClean="0">
-                <a:latin typeface="Consolas" panose="020B0609020204030204" pitchFamily="49" charset="0"/>
-              </a:rPr>
-              <a:t> e)</a:t>
-            </a:r>
-            <a:endParaRPr lang="da-DK" sz="2000" b="1">
-              <a:latin typeface="Consolas" panose="020B0609020204030204" pitchFamily="49" charset="0"/>
-            </a:endParaRPr>
-          </a:p>
-          <a:p>
-            <a:r>
-              <a:rPr lang="en-US" sz="2000" b="1" smtClean="0">
-                <a:latin typeface="Consolas" panose="020B0609020204030204" pitchFamily="49" charset="0"/>
-              </a:rPr>
-              <a:t>    {</a:t>
-            </a:r>
-            <a:endParaRPr lang="da-DK" sz="2000" b="1">
-              <a:latin typeface="Consolas" panose="020B0609020204030204" pitchFamily="49" charset="0"/>
-            </a:endParaRPr>
-          </a:p>
-          <a:p>
-            <a:r>
-              <a:rPr lang="en-US" sz="2000" b="1" smtClean="0">
-                <a:latin typeface="Consolas" panose="020B0609020204030204" pitchFamily="49" charset="0"/>
-              </a:rPr>
-              <a:t>        errorHandler.Handle(</a:t>
-            </a:r>
-            <a:r>
-              <a:rPr lang="en-US" sz="2000" b="1" smtClean="0">
-                <a:solidFill>
-                  <a:schemeClr val="accent6">
-                    <a:lumMod val="75000"/>
-                  </a:schemeClr>
-                </a:solidFill>
-                <a:latin typeface="Consolas" panose="020B0609020204030204" pitchFamily="49" charset="0"/>
-              </a:rPr>
-              <a:t>Action</a:t>
-            </a:r>
-            <a:r>
-              <a:rPr lang="en-US" sz="2000" b="1" smtClean="0">
-                <a:latin typeface="Consolas" panose="020B0609020204030204" pitchFamily="49" charset="0"/>
-              </a:rPr>
-              <a:t>.Deposit, e);</a:t>
-            </a:r>
-          </a:p>
-          <a:p>
-            <a:r>
-              <a:rPr lang="en-US" sz="2000" b="1">
-                <a:latin typeface="Consolas" panose="020B0609020204030204" pitchFamily="49" charset="0"/>
-              </a:rPr>
-              <a:t> </a:t>
-            </a:r>
-            <a:r>
-              <a:rPr lang="en-US" sz="2000" b="1" smtClean="0">
-                <a:latin typeface="Consolas" panose="020B0609020204030204" pitchFamily="49" charset="0"/>
-              </a:rPr>
-              <a:t>       </a:t>
-            </a:r>
-            <a:r>
-              <a:rPr lang="en-US" sz="2000" b="1">
-                <a:solidFill>
-                  <a:srgbClr val="FF0000"/>
-                </a:solidFill>
-                <a:latin typeface="Consolas" panose="020B0609020204030204" pitchFamily="49" charset="0"/>
-              </a:rPr>
-              <a:t>throw</a:t>
-            </a:r>
-            <a:r>
-              <a:rPr lang="en-US" sz="2000" b="1" smtClean="0">
-                <a:solidFill>
-                  <a:srgbClr val="FF0000"/>
-                </a:solidFill>
-                <a:latin typeface="Consolas" panose="020B0609020204030204" pitchFamily="49" charset="0"/>
-              </a:rPr>
-              <a:t>;</a:t>
-            </a:r>
-          </a:p>
-          <a:p>
-            <a:r>
-              <a:rPr lang="en-US" sz="2000" b="1">
-                <a:latin typeface="Consolas" panose="020B0609020204030204" pitchFamily="49" charset="0"/>
-              </a:rPr>
-              <a:t> </a:t>
-            </a:r>
-            <a:r>
-              <a:rPr lang="en-US" sz="2000" b="1" smtClean="0">
-                <a:latin typeface="Consolas" panose="020B0609020204030204" pitchFamily="49" charset="0"/>
-              </a:rPr>
-              <a:t>   }</a:t>
-            </a:r>
-            <a:endParaRPr lang="da-DK" sz="2000" b="1">
-              <a:latin typeface="Consolas" panose="020B0609020204030204" pitchFamily="49" charset="0"/>
-            </a:endParaRPr>
-          </a:p>
-          <a:p>
-            <a:endParaRPr lang="da-DK" sz="2000" b="1">
-              <a:latin typeface="Consolas" panose="020B0609020204030204" pitchFamily="49" charset="0"/>
-            </a:endParaRPr>
-          </a:p>
-          <a:p>
-            <a:r>
-              <a:rPr lang="da-DK" sz="2000" b="1" smtClean="0">
-                <a:latin typeface="Consolas" panose="020B0609020204030204" pitchFamily="49" charset="0"/>
-              </a:rPr>
-              <a:t>    …</a:t>
-            </a:r>
-            <a:endParaRPr lang="da-DK" sz="2000" b="1" smtClean="0">
-              <a:latin typeface="Consolas" panose="020B0609020204030204" pitchFamily="49" charset="0"/>
-            </a:endParaRPr>
-          </a:p>
-          <a:p>
-            <a:r>
-              <a:rPr lang="da-DK" sz="2000" b="1" smtClean="0">
-                <a:latin typeface="Consolas" panose="020B0609020204030204" pitchFamily="49" charset="0"/>
-              </a:rPr>
-              <a:t>}</a:t>
-            </a:r>
+              <a:rPr lang="da-DK" smtClean="0"/>
+              <a:t>Exceptions recommendations</a:t>
+            </a:r>
+            <a:endParaRPr lang="da-DK"/>
+          </a:p>
+        </p:txBody>
+      </p:sp>
+      <p:sp>
+        <p:nvSpPr>
+          <p:cNvPr id="3" name="Pladsholder til indhold 2"/>
+          <p:cNvSpPr>
+            <a:spLocks noGrp="1"/>
+          </p:cNvSpPr>
+          <p:nvPr>
+            <p:ph idx="1"/>
+          </p:nvPr>
+        </p:nvSpPr>
+        <p:spPr/>
+        <p:txBody>
+          <a:bodyPr/>
+          <a:lstStyle/>
+          <a:p>
+            <a:r>
+              <a:rPr lang="da-DK" sz="3200" b="1" smtClean="0"/>
+              <a:t>Use typed exception classes</a:t>
+            </a:r>
+          </a:p>
+          <a:p>
+            <a:r>
+              <a:rPr lang="da-DK" sz="3200" b="1" smtClean="0"/>
+              <a:t>Throw early</a:t>
+            </a:r>
+          </a:p>
+          <a:p>
+            <a:r>
+              <a:rPr lang="da-DK" sz="3200" b="1" smtClean="0"/>
+              <a:t>Catch late</a:t>
+            </a:r>
+          </a:p>
+          <a:p>
+            <a:r>
+              <a:rPr lang="da-DK" sz="3200" b="1" smtClean="0"/>
+              <a:t>Consider rethrowing</a:t>
+            </a:r>
+          </a:p>
+          <a:p>
+            <a:endParaRPr lang="da-DK"/>
           </a:p>
         </p:txBody>
       </p:sp>
     </p:spTree>
     <p:extLst>
       <p:ext uri="{BB962C8B-B14F-4D97-AF65-F5344CB8AC3E}">
-        <p14:creationId xmlns:p14="http://schemas.microsoft.com/office/powerpoint/2010/main" val="2082888062"/>
+        <p14:creationId xmlns:p14="http://schemas.microsoft.com/office/powerpoint/2010/main" val="649966667"/>
       </p:ext>
     </p:extLst>
   </p:cSld>
   <p:clrMapOvr>
     <a:masterClrMapping/>
   </p:clrMapOvr>
-  <mc:AlternateContent xmlns:mc="http://schemas.openxmlformats.org/markup-compatibility/2006" xmlns:p14="http://schemas.microsoft.com/office/powerpoint/2010/main">
-    <mc:Choice Requires="p14">
-      <p:transition p14:dur="0"/>
-    </mc:Choice>
-    <mc:Fallback xmlns="">
-      <p:transition/>
-    </mc:Fallback>
-  </mc:AlternateContent>
   <p:timing>
     <p:tnLst>
       <p:par>
@@ -13640,109 +13231,6 @@
 </p:sld>
 </file>
 
-<file path=ppt/slides/slide30.xml><?xml version="1.0" encoding="utf-8"?>
-<p:sld xmlns:a="http://schemas.openxmlformats.org/drawingml/2006/main" xmlns:r="http://schemas.openxmlformats.org/officeDocument/2006/relationships" xmlns:p="http://schemas.openxmlformats.org/presentationml/2006/main">
-  <p:cSld>
-    <p:spTree>
-      <p:nvGrpSpPr>
-        <p:cNvPr id="1" name=""/>
-        <p:cNvGrpSpPr/>
-        <p:nvPr/>
-      </p:nvGrpSpPr>
-      <p:grpSpPr>
-        <a:xfrm>
-          <a:off x="0" y="0"/>
-          <a:ext cx="0" cy="0"/>
-          <a:chOff x="0" y="0"/>
-          <a:chExt cx="0" cy="0"/>
-        </a:xfrm>
-      </p:grpSpPr>
-      <p:sp>
-        <p:nvSpPr>
-          <p:cNvPr id="2" name="Titel 1"/>
-          <p:cNvSpPr>
-            <a:spLocks noGrp="1"/>
-          </p:cNvSpPr>
-          <p:nvPr>
-            <p:ph type="title"/>
-          </p:nvPr>
-        </p:nvSpPr>
-        <p:spPr/>
-        <p:txBody>
-          <a:bodyPr/>
-          <a:lstStyle/>
-          <a:p>
-            <a:r>
-              <a:rPr lang="da-DK" smtClean="0"/>
-              <a:t>Exceptions recommendations</a:t>
-            </a:r>
-            <a:endParaRPr lang="da-DK"/>
-          </a:p>
-        </p:txBody>
-      </p:sp>
-      <p:sp>
-        <p:nvSpPr>
-          <p:cNvPr id="3" name="Pladsholder til indhold 2"/>
-          <p:cNvSpPr>
-            <a:spLocks noGrp="1"/>
-          </p:cNvSpPr>
-          <p:nvPr>
-            <p:ph idx="1"/>
-          </p:nvPr>
-        </p:nvSpPr>
-        <p:spPr/>
-        <p:txBody>
-          <a:bodyPr/>
-          <a:lstStyle/>
-          <a:p>
-            <a:r>
-              <a:rPr lang="da-DK" sz="3200" b="1" smtClean="0"/>
-              <a:t>Use typed exception classes</a:t>
-            </a:r>
-          </a:p>
-          <a:p>
-            <a:r>
-              <a:rPr lang="da-DK" sz="3200" b="1" smtClean="0"/>
-              <a:t>Throw early</a:t>
-            </a:r>
-          </a:p>
-          <a:p>
-            <a:r>
-              <a:rPr lang="da-DK" sz="3200" b="1" smtClean="0"/>
-              <a:t>Catch late</a:t>
-            </a:r>
-          </a:p>
-          <a:p>
-            <a:r>
-              <a:rPr lang="da-DK" sz="3200" b="1" smtClean="0"/>
-              <a:t>Consider rethrowing</a:t>
-            </a:r>
-          </a:p>
-          <a:p>
-            <a:endParaRPr lang="da-DK"/>
-          </a:p>
-        </p:txBody>
-      </p:sp>
-    </p:spTree>
-    <p:extLst>
-      <p:ext uri="{BB962C8B-B14F-4D97-AF65-F5344CB8AC3E}">
-        <p14:creationId xmlns:p14="http://schemas.microsoft.com/office/powerpoint/2010/main" val="649966667"/>
-      </p:ext>
-    </p:extLst>
-  </p:cSld>
-  <p:clrMapOvr>
-    <a:masterClrMapping/>
-  </p:clrMapOvr>
-  <p:timing>
-    <p:tnLst>
-      <p:par>
-        <p:cTn id="1" dur="indefinite" restart="never" nodeType="tmRoot"/>
-      </p:par>
-    </p:tnLst>
-  </p:timing>
-</p:sld>
-</file>
-
 <file path=ppt/slides/slide4.xml><?xml version="1.0" encoding="utf-8"?>
 <p:sld xmlns:a="http://schemas.openxmlformats.org/drawingml/2006/main" xmlns:r="http://schemas.openxmlformats.org/officeDocument/2006/relationships" xmlns:p="http://schemas.openxmlformats.org/presentationml/2006/main">
   <p:cSld>
@@ -13909,9 +13397,6 @@
               </a:rPr>
               <a:t>    …</a:t>
             </a:r>
-            <a:endParaRPr lang="da-DK" sz="2800" b="1" smtClean="0">
-              <a:latin typeface="Consolas" panose="020B0609020204030204" pitchFamily="49" charset="0"/>
-            </a:endParaRPr>
           </a:p>
           <a:p>
             <a:r>
@@ -14253,9 +13738,6 @@
               </a:rPr>
               <a:t>    …</a:t>
             </a:r>
-            <a:endParaRPr lang="da-DK" sz="2800" b="1" smtClean="0">
-              <a:latin typeface="Consolas" panose="020B0609020204030204" pitchFamily="49" charset="0"/>
-            </a:endParaRPr>
           </a:p>
           <a:p>
             <a:r>
@@ -14318,13 +13800,13 @@
   <p:clrMapOvr>
     <a:masterClrMapping/>
   </p:clrMapOvr>
-  <mc:AlternateContent xmlns:mc="http://schemas.openxmlformats.org/markup-compatibility/2006">
-    <mc:Choice xmlns:p14="http://schemas.microsoft.com/office/powerpoint/2010/main" Requires="p14">
+  <mc:AlternateContent xmlns:mc="http://schemas.openxmlformats.org/markup-compatibility/2006" xmlns:p14="http://schemas.microsoft.com/office/powerpoint/2010/main">
+    <mc:Choice Requires="p14">
       <p:transition spd="med" p14:dur="700">
         <p:fade/>
       </p:transition>
     </mc:Choice>
-    <mc:Fallback>
+    <mc:Fallback xmlns="">
       <p:transition spd="med">
         <p:fade/>
       </p:transition>
@@ -14652,9 +14134,6 @@
               </a:rPr>
               <a:t>    …</a:t>
             </a:r>
-            <a:endParaRPr lang="da-DK" sz="2800" b="1" smtClean="0">
-              <a:latin typeface="Consolas" panose="020B0609020204030204" pitchFamily="49" charset="0"/>
-            </a:endParaRPr>
           </a:p>
           <a:p>
             <a:r>
@@ -14724,13 +14203,13 @@
   <p:clrMapOvr>
     <a:masterClrMapping/>
   </p:clrMapOvr>
-  <mc:AlternateContent xmlns:mc="http://schemas.openxmlformats.org/markup-compatibility/2006">
-    <mc:Choice xmlns:p14="http://schemas.microsoft.com/office/powerpoint/2010/main" Requires="p14">
+  <mc:AlternateContent xmlns:mc="http://schemas.openxmlformats.org/markup-compatibility/2006" xmlns:p14="http://schemas.microsoft.com/office/powerpoint/2010/main">
+    <mc:Choice Requires="p14">
       <p:transition spd="med" p14:dur="700">
         <p:fade/>
       </p:transition>
     </mc:Choice>
-    <mc:Fallback>
+    <mc:Fallback xmlns="">
       <p:transition spd="med">
         <p:fade/>
       </p:transition>
@@ -15406,11 +14885,11 @@
   <p:clrMapOvr>
     <a:masterClrMapping/>
   </p:clrMapOvr>
-  <mc:AlternateContent xmlns:mc="http://schemas.openxmlformats.org/markup-compatibility/2006">
-    <mc:Choice xmlns:p14="http://schemas.microsoft.com/office/powerpoint/2010/main" Requires="p14">
+  <mc:AlternateContent xmlns:mc="http://schemas.openxmlformats.org/markup-compatibility/2006" xmlns:p14="http://schemas.microsoft.com/office/powerpoint/2010/main">
+    <mc:Choice Requires="p14">
       <p:transition p14:dur="0"/>
     </mc:Choice>
-    <mc:Fallback>
+    <mc:Fallback xmlns="">
       <p:transition/>
     </mc:Fallback>
   </mc:AlternateContent>

</xml_diff>